<commit_message>
fix dg sequence diagram
</commit_message>
<xml_diff>
--- a/docs/diagrams/AddCommandSD.pptx
+++ b/docs/diagrams/AddCommandSD.pptx
@@ -5,11 +5,12 @@
     <p:sldMasterId id="2147483648" r:id="rId1"/>
   </p:sldMasterIdLst>
   <p:notesMasterIdLst>
-    <p:notesMasterId r:id="rId4"/>
+    <p:notesMasterId r:id="rId5"/>
   </p:notesMasterIdLst>
   <p:sldIdLst>
     <p:sldId id="267" r:id="rId2"/>
     <p:sldId id="268" r:id="rId3"/>
+    <p:sldId id="269" r:id="rId4"/>
   </p:sldIdLst>
   <p:sldSz cx="35999738" cy="35999738"/>
   <p:notesSz cx="6858000" cy="9144000"/>
@@ -209,7 +210,7 @@
           <a:p>
             <a:fld id="{F5CC4B3F-88C1-4FFA-B1B6-F41C21DC6924}" type="datetimeFigureOut">
               <a:rPr lang="en-US" smtClean="0"/>
-              <a:t>4/7/19</a:t>
+              <a:t>4/15/19</a:t>
             </a:fld>
             <a:endParaRPr lang="en-US"/>
           </a:p>
@@ -744,7 +745,7 @@
           <a:p>
             <a:fld id="{78C97017-6FC3-485B-9764-EAC9E56C1D49}" type="datetimeFigureOut">
               <a:rPr lang="en-US" smtClean="0"/>
-              <a:t>4/7/19</a:t>
+              <a:t>4/15/19</a:t>
             </a:fld>
             <a:endParaRPr lang="en-US"/>
           </a:p>
@@ -912,7 +913,7 @@
           <a:p>
             <a:fld id="{78C97017-6FC3-485B-9764-EAC9E56C1D49}" type="datetimeFigureOut">
               <a:rPr lang="en-US" smtClean="0"/>
-              <a:t>4/7/19</a:t>
+              <a:t>4/15/19</a:t>
             </a:fld>
             <a:endParaRPr lang="en-US"/>
           </a:p>
@@ -1090,7 +1091,7 @@
           <a:p>
             <a:fld id="{78C97017-6FC3-485B-9764-EAC9E56C1D49}" type="datetimeFigureOut">
               <a:rPr lang="en-US" smtClean="0"/>
-              <a:t>4/7/19</a:t>
+              <a:t>4/15/19</a:t>
             </a:fld>
             <a:endParaRPr lang="en-US"/>
           </a:p>
@@ -1258,7 +1259,7 @@
           <a:p>
             <a:fld id="{78C97017-6FC3-485B-9764-EAC9E56C1D49}" type="datetimeFigureOut">
               <a:rPr lang="en-US" smtClean="0"/>
-              <a:t>4/7/19</a:t>
+              <a:t>4/15/19</a:t>
             </a:fld>
             <a:endParaRPr lang="en-US"/>
           </a:p>
@@ -1503,7 +1504,7 @@
           <a:p>
             <a:fld id="{78C97017-6FC3-485B-9764-EAC9E56C1D49}" type="datetimeFigureOut">
               <a:rPr lang="en-US" smtClean="0"/>
-              <a:t>4/7/19</a:t>
+              <a:t>4/15/19</a:t>
             </a:fld>
             <a:endParaRPr lang="en-US"/>
           </a:p>
@@ -1788,7 +1789,7 @@
           <a:p>
             <a:fld id="{78C97017-6FC3-485B-9764-EAC9E56C1D49}" type="datetimeFigureOut">
               <a:rPr lang="en-US" smtClean="0"/>
-              <a:t>4/7/19</a:t>
+              <a:t>4/15/19</a:t>
             </a:fld>
             <a:endParaRPr lang="en-US"/>
           </a:p>
@@ -2207,7 +2208,7 @@
           <a:p>
             <a:fld id="{78C97017-6FC3-485B-9764-EAC9E56C1D49}" type="datetimeFigureOut">
               <a:rPr lang="en-US" smtClean="0"/>
-              <a:t>4/7/19</a:t>
+              <a:t>4/15/19</a:t>
             </a:fld>
             <a:endParaRPr lang="en-US"/>
           </a:p>
@@ -2324,7 +2325,7 @@
           <a:p>
             <a:fld id="{78C97017-6FC3-485B-9764-EAC9E56C1D49}" type="datetimeFigureOut">
               <a:rPr lang="en-US" smtClean="0"/>
-              <a:t>4/7/19</a:t>
+              <a:t>4/15/19</a:t>
             </a:fld>
             <a:endParaRPr lang="en-US"/>
           </a:p>
@@ -2419,7 +2420,7 @@
           <a:p>
             <a:fld id="{78C97017-6FC3-485B-9764-EAC9E56C1D49}" type="datetimeFigureOut">
               <a:rPr lang="en-US" smtClean="0"/>
-              <a:t>4/7/19</a:t>
+              <a:t>4/15/19</a:t>
             </a:fld>
             <a:endParaRPr lang="en-US"/>
           </a:p>
@@ -2694,7 +2695,7 @@
           <a:p>
             <a:fld id="{78C97017-6FC3-485B-9764-EAC9E56C1D49}" type="datetimeFigureOut">
               <a:rPr lang="en-US" smtClean="0"/>
-              <a:t>4/7/19</a:t>
+              <a:t>4/15/19</a:t>
             </a:fld>
             <a:endParaRPr lang="en-US"/>
           </a:p>
@@ -2946,7 +2947,7 @@
           <a:p>
             <a:fld id="{78C97017-6FC3-485B-9764-EAC9E56C1D49}" type="datetimeFigureOut">
               <a:rPr lang="en-US" smtClean="0"/>
-              <a:t>4/7/19</a:t>
+              <a:t>4/15/19</a:t>
             </a:fld>
             <a:endParaRPr lang="en-US"/>
           </a:p>
@@ -3157,7 +3158,7 @@
           <a:p>
             <a:fld id="{78C97017-6FC3-485B-9764-EAC9E56C1D49}" type="datetimeFigureOut">
               <a:rPr lang="en-US" smtClean="0"/>
-              <a:t>4/7/19</a:t>
+              <a:t>4/15/19</a:t>
             </a:fld>
             <a:endParaRPr lang="en-US"/>
           </a:p>
@@ -3595,67 +3596,6 @@
       </p:sp>
       <p:sp>
         <p:nvSpPr>
-          <p:cNvPr id="81" name="Rectangle 65"/>
-          <p:cNvSpPr/>
-          <p:nvPr/>
-        </p:nvSpPr>
-        <p:spPr>
-          <a:xfrm>
-            <a:off x="11446669" y="15028069"/>
-            <a:ext cx="14105406" cy="8307919"/>
-          </a:xfrm>
-          <a:prstGeom prst="roundRect">
-            <a:avLst>
-              <a:gd name="adj" fmla="val 3484"/>
-            </a:avLst>
-          </a:prstGeom>
-          <a:solidFill>
-            <a:schemeClr val="accent1">
-              <a:lumMod val="20000"/>
-              <a:lumOff val="80000"/>
-            </a:schemeClr>
-          </a:solidFill>
-          <a:ln w="19050">
-            <a:noFill/>
-          </a:ln>
-          <a:effectLst/>
-        </p:spPr>
-        <p:style>
-          <a:lnRef idx="1">
-            <a:schemeClr val="accent2"/>
-          </a:lnRef>
-          <a:fillRef idx="2">
-            <a:schemeClr val="accent2"/>
-          </a:fillRef>
-          <a:effectRef idx="1">
-            <a:schemeClr val="accent2"/>
-          </a:effectRef>
-          <a:fontRef idx="minor">
-            <a:schemeClr val="dk1"/>
-          </a:fontRef>
-        </p:style>
-        <p:txBody>
-          <a:bodyPr rtlCol="0" anchor="t"/>
-          <a:lstStyle/>
-          <a:p>
-            <a:r>
-              <a:rPr lang="en-US" sz="1200" b="1" dirty="0">
-                <a:solidFill>
-                  <a:srgbClr val="0070C0"/>
-                </a:solidFill>
-              </a:rPr>
-              <a:t>Logic</a:t>
-            </a:r>
-            <a:endParaRPr lang="en-SG" sz="1200" b="1" dirty="0">
-              <a:solidFill>
-                <a:srgbClr val="0070C0"/>
-              </a:solidFill>
-            </a:endParaRPr>
-          </a:p>
-        </p:txBody>
-      </p:sp>
-      <p:sp>
-        <p:nvSpPr>
           <p:cNvPr id="2" name="Rectangle 62"/>
           <p:cNvSpPr/>
           <p:nvPr/>
@@ -4538,8 +4478,8 @@
         </p:nvSpPr>
         <p:spPr>
           <a:xfrm>
-            <a:off x="17849389" y="16791650"/>
-            <a:ext cx="2359015" cy="430887"/>
+            <a:off x="18341927" y="16791651"/>
+            <a:ext cx="1866477" cy="430887"/>
           </a:xfrm>
           <a:prstGeom prst="rect">
             <a:avLst/>
@@ -4658,189 +4598,6 @@
       </p:sp>
       <p:sp>
         <p:nvSpPr>
-          <p:cNvPr id="40" name="Rectangle 62"/>
-          <p:cNvSpPr/>
-          <p:nvPr/>
-        </p:nvSpPr>
-        <p:spPr>
-          <a:xfrm>
-            <a:off x="26903869" y="20680180"/>
-            <a:ext cx="925800" cy="300180"/>
-          </a:xfrm>
-          <a:prstGeom prst="rect">
-            <a:avLst/>
-          </a:prstGeom>
-          <a:solidFill>
-            <a:srgbClr val="7030A0"/>
-          </a:solidFill>
-          <a:ln w="19050">
-            <a:solidFill>
-              <a:srgbClr val="7030A0"/>
-            </a:solidFill>
-          </a:ln>
-          <a:effectLst/>
-        </p:spPr>
-        <p:style>
-          <a:lnRef idx="1">
-            <a:schemeClr val="accent2"/>
-          </a:lnRef>
-          <a:fillRef idx="2">
-            <a:schemeClr val="accent2"/>
-          </a:fillRef>
-          <a:effectRef idx="1">
-            <a:schemeClr val="accent2"/>
-          </a:effectRef>
-          <a:fontRef idx="minor">
-            <a:schemeClr val="dk1"/>
-          </a:fontRef>
-        </p:style>
-        <p:txBody>
-          <a:bodyPr rtlCol="0" anchor="ctr"/>
-          <a:lstStyle/>
-          <a:p>
-            <a:pPr algn="ctr"/>
-            <a:r>
-              <a:rPr lang="en-US" sz="1600" dirty="0">
-                <a:solidFill>
-                  <a:schemeClr val="bg1"/>
-                </a:solidFill>
-              </a:rPr>
-              <a:t>: Model</a:t>
-            </a:r>
-            <a:endParaRPr lang="en-SG" sz="1600" dirty="0">
-              <a:solidFill>
-                <a:schemeClr val="bg1"/>
-              </a:solidFill>
-            </a:endParaRPr>
-          </a:p>
-        </p:txBody>
-      </p:sp>
-      <p:cxnSp>
-        <p:nvCxnSpPr>
-          <p:cNvPr id="46" name="Straight Connector 45"/>
-          <p:cNvCxnSpPr>
-            <a:cxnSpLocks/>
-          </p:cNvCxnSpPr>
-          <p:nvPr/>
-        </p:nvCxnSpPr>
-        <p:spPr>
-          <a:xfrm flipH="1">
-            <a:off x="27361478" y="20980360"/>
-            <a:ext cx="3599" cy="1304065"/>
-          </a:xfrm>
-          <a:prstGeom prst="line">
-            <a:avLst/>
-          </a:prstGeom>
-          <a:ln w="19050">
-            <a:solidFill>
-              <a:srgbClr val="7030A0"/>
-            </a:solidFill>
-            <a:prstDash val="sysDash"/>
-          </a:ln>
-          <a:effectLst/>
-        </p:spPr>
-        <p:style>
-          <a:lnRef idx="1">
-            <a:schemeClr val="accent1"/>
-          </a:lnRef>
-          <a:fillRef idx="2">
-            <a:schemeClr val="accent1"/>
-          </a:fillRef>
-          <a:effectRef idx="1">
-            <a:schemeClr val="accent1"/>
-          </a:effectRef>
-          <a:fontRef idx="minor">
-            <a:schemeClr val="dk1"/>
-          </a:fontRef>
-        </p:style>
-      </p:cxnSp>
-      <p:sp>
-        <p:nvSpPr>
-          <p:cNvPr id="49" name="Rectangle 48"/>
-          <p:cNvSpPr/>
-          <p:nvPr/>
-        </p:nvSpPr>
-        <p:spPr>
-          <a:xfrm>
-            <a:off x="27280913" y="21491747"/>
-            <a:ext cx="167756" cy="633901"/>
-          </a:xfrm>
-          <a:prstGeom prst="rect">
-            <a:avLst/>
-          </a:prstGeom>
-          <a:solidFill>
-            <a:srgbClr val="7030A0"/>
-          </a:solidFill>
-          <a:ln>
-            <a:solidFill>
-              <a:srgbClr val="7030A0"/>
-            </a:solidFill>
-          </a:ln>
-          <a:effectLst/>
-        </p:spPr>
-        <p:style>
-          <a:lnRef idx="1">
-            <a:schemeClr val="accent3"/>
-          </a:lnRef>
-          <a:fillRef idx="2">
-            <a:schemeClr val="accent3"/>
-          </a:fillRef>
-          <a:effectRef idx="1">
-            <a:schemeClr val="accent3"/>
-          </a:effectRef>
-          <a:fontRef idx="minor">
-            <a:schemeClr val="dk1"/>
-          </a:fontRef>
-        </p:style>
-        <p:txBody>
-          <a:bodyPr rtlCol="0" anchor="ctr"/>
-          <a:lstStyle/>
-          <a:p>
-            <a:pPr algn="ctr"/>
-            <a:endParaRPr lang="en-SG" sz="1400"/>
-          </a:p>
-        </p:txBody>
-      </p:sp>
-      <p:cxnSp>
-        <p:nvCxnSpPr>
-          <p:cNvPr id="50" name="Straight Arrow Connector 49"/>
-          <p:cNvCxnSpPr>
-            <a:cxnSpLocks/>
-          </p:cNvCxnSpPr>
-          <p:nvPr/>
-        </p:nvCxnSpPr>
-        <p:spPr>
-          <a:xfrm>
-            <a:off x="24417225" y="21501297"/>
-            <a:ext cx="2872799" cy="0"/>
-          </a:xfrm>
-          <a:prstGeom prst="straightConnector1">
-            <a:avLst/>
-          </a:prstGeom>
-          <a:ln w="19050">
-            <a:solidFill>
-              <a:srgbClr val="0070C0"/>
-            </a:solidFill>
-            <a:tailEnd type="arrow"/>
-          </a:ln>
-        </p:spPr>
-        <p:style>
-          <a:lnRef idx="1">
-            <a:schemeClr val="accent1"/>
-          </a:lnRef>
-          <a:fillRef idx="0">
-            <a:schemeClr val="accent1"/>
-          </a:fillRef>
-          <a:effectRef idx="0">
-            <a:schemeClr val="accent1"/>
-          </a:effectRef>
-          <a:fontRef idx="minor">
-            <a:schemeClr val="tx1"/>
-          </a:fontRef>
-        </p:style>
-      </p:cxnSp>
-      <p:sp>
-        <p:nvSpPr>
           <p:cNvPr id="4" name="TextBox 3"/>
           <p:cNvSpPr txBox="1"/>
           <p:nvPr/>
@@ -5334,53 +5091,6 @@
           </a:p>
         </p:txBody>
       </p:sp>
-      <p:cxnSp>
-        <p:nvCxnSpPr>
-          <p:cNvPr id="63" name="Straight Arrow Connector 62">
-            <a:extLst>
-              <a:ext uri="{FF2B5EF4-FFF2-40B4-BE49-F238E27FC236}">
-                <a16:creationId xmlns:a16="http://schemas.microsoft.com/office/drawing/2014/main" id="{7C9F21BC-13A9-471F-825A-2621FD36355F}"/>
-              </a:ext>
-            </a:extLst>
-          </p:cNvPr>
-          <p:cNvCxnSpPr>
-            <a:cxnSpLocks/>
-            <a:endCxn id="49" idx="2"/>
-          </p:cNvCxnSpPr>
-          <p:nvPr/>
-        </p:nvCxnSpPr>
-        <p:spPr>
-          <a:xfrm>
-            <a:off x="24518720" y="22125648"/>
-            <a:ext cx="2846071" cy="0"/>
-          </a:xfrm>
-          <a:prstGeom prst="straightConnector1">
-            <a:avLst/>
-          </a:prstGeom>
-          <a:ln w="19050">
-            <a:solidFill>
-              <a:srgbClr val="7030A0"/>
-            </a:solidFill>
-            <a:prstDash val="sysDash"/>
-            <a:headEnd type="arrow" w="med" len="med"/>
-            <a:tailEnd type="none" w="med" len="med"/>
-          </a:ln>
-        </p:spPr>
-        <p:style>
-          <a:lnRef idx="1">
-            <a:schemeClr val="accent1"/>
-          </a:lnRef>
-          <a:fillRef idx="0">
-            <a:schemeClr val="accent1"/>
-          </a:fillRef>
-          <a:effectRef idx="0">
-            <a:schemeClr val="accent1"/>
-          </a:effectRef>
-          <a:fontRef idx="minor">
-            <a:schemeClr val="tx1"/>
-          </a:fontRef>
-        </p:style>
-      </p:cxnSp>
       <p:cxnSp>
         <p:nvCxnSpPr>
           <p:cNvPr id="95" name="Straight Connector 94">
@@ -6785,6 +6495,4176 @@
     <p:extLst>
       <p:ext uri="{BB962C8B-B14F-4D97-AF65-F5344CB8AC3E}">
         <p14:creationId xmlns:p14="http://schemas.microsoft.com/office/powerpoint/2010/main" val="244193035"/>
+      </p:ext>
+    </p:extLst>
+  </p:cSld>
+  <p:clrMapOvr>
+    <a:masterClrMapping/>
+  </p:clrMapOvr>
+</p:sld>
+</file>
+
+<file path=ppt/slides/slide3.xml><?xml version="1.0" encoding="utf-8"?>
+<p:sld xmlns:a="http://schemas.openxmlformats.org/drawingml/2006/main" xmlns:r="http://schemas.openxmlformats.org/officeDocument/2006/relationships" xmlns:p="http://schemas.openxmlformats.org/presentationml/2006/main">
+  <p:cSld>
+    <p:spTree>
+      <p:nvGrpSpPr>
+        <p:cNvPr id="1" name=""/>
+        <p:cNvGrpSpPr/>
+        <p:nvPr/>
+      </p:nvGrpSpPr>
+      <p:grpSpPr>
+        <a:xfrm>
+          <a:off x="0" y="0"/>
+          <a:ext cx="0" cy="0"/>
+          <a:chOff x="0" y="0"/>
+          <a:chExt cx="0" cy="0"/>
+        </a:xfrm>
+      </p:grpSpPr>
+      <p:sp>
+        <p:nvSpPr>
+          <p:cNvPr id="110" name="Rectangle 65">
+            <a:extLst>
+              <a:ext uri="{FF2B5EF4-FFF2-40B4-BE49-F238E27FC236}">
+                <a16:creationId xmlns:a16="http://schemas.microsoft.com/office/drawing/2014/main" id="{78FAB39A-4A42-A14B-93EB-61BCF9FB629B}"/>
+              </a:ext>
+            </a:extLst>
+          </p:cNvPr>
+          <p:cNvSpPr/>
+          <p:nvPr/>
+        </p:nvSpPr>
+        <p:spPr>
+          <a:xfrm>
+            <a:off x="2817867" y="13906412"/>
+            <a:ext cx="15042233" cy="12768415"/>
+          </a:xfrm>
+          <a:prstGeom prst="roundRect">
+            <a:avLst>
+              <a:gd name="adj" fmla="val 3484"/>
+            </a:avLst>
+          </a:prstGeom>
+          <a:solidFill>
+            <a:schemeClr val="accent1">
+              <a:lumMod val="20000"/>
+              <a:lumOff val="80000"/>
+            </a:schemeClr>
+          </a:solidFill>
+          <a:ln w="19050">
+            <a:noFill/>
+          </a:ln>
+          <a:effectLst/>
+        </p:spPr>
+        <p:style>
+          <a:lnRef idx="1">
+            <a:schemeClr val="accent2"/>
+          </a:lnRef>
+          <a:fillRef idx="2">
+            <a:schemeClr val="accent2"/>
+          </a:fillRef>
+          <a:effectRef idx="1">
+            <a:schemeClr val="accent2"/>
+          </a:effectRef>
+          <a:fontRef idx="minor">
+            <a:schemeClr val="dk1"/>
+          </a:fontRef>
+        </p:style>
+        <p:txBody>
+          <a:bodyPr rtlCol="0" anchor="t"/>
+          <a:lstStyle/>
+          <a:p>
+            <a:r>
+              <a:rPr lang="en-US" sz="1200" b="1" dirty="0">
+                <a:solidFill>
+                  <a:srgbClr val="7030A0"/>
+                </a:solidFill>
+              </a:rPr>
+              <a:t>Model</a:t>
+            </a:r>
+            <a:endParaRPr lang="en-SG" sz="1200" b="1" dirty="0">
+              <a:solidFill>
+                <a:srgbClr val="7030A0"/>
+              </a:solidFill>
+            </a:endParaRPr>
+          </a:p>
+        </p:txBody>
+      </p:sp>
+      <p:sp>
+        <p:nvSpPr>
+          <p:cNvPr id="109" name="Rectangle 65">
+            <a:extLst>
+              <a:ext uri="{FF2B5EF4-FFF2-40B4-BE49-F238E27FC236}">
+                <a16:creationId xmlns:a16="http://schemas.microsoft.com/office/drawing/2014/main" id="{2CA5C4AE-3F50-854E-91DC-CA8CB1FD9D7B}"/>
+              </a:ext>
+            </a:extLst>
+          </p:cNvPr>
+          <p:cNvSpPr/>
+          <p:nvPr/>
+        </p:nvSpPr>
+        <p:spPr>
+          <a:xfrm>
+            <a:off x="17999869" y="13906412"/>
+            <a:ext cx="3332096" cy="12856453"/>
+          </a:xfrm>
+          <a:prstGeom prst="roundRect">
+            <a:avLst>
+              <a:gd name="adj" fmla="val 3484"/>
+            </a:avLst>
+          </a:prstGeom>
+          <a:solidFill>
+            <a:schemeClr val="accent4">
+              <a:lumMod val="20000"/>
+              <a:lumOff val="80000"/>
+            </a:schemeClr>
+          </a:solidFill>
+          <a:ln w="19050">
+            <a:noFill/>
+          </a:ln>
+          <a:effectLst/>
+        </p:spPr>
+        <p:style>
+          <a:lnRef idx="1">
+            <a:schemeClr val="accent2"/>
+          </a:lnRef>
+          <a:fillRef idx="2">
+            <a:schemeClr val="accent2"/>
+          </a:fillRef>
+          <a:effectRef idx="1">
+            <a:schemeClr val="accent2"/>
+          </a:effectRef>
+          <a:fontRef idx="minor">
+            <a:schemeClr val="dk1"/>
+          </a:fontRef>
+        </p:style>
+        <p:txBody>
+          <a:bodyPr rtlCol="0" anchor="t"/>
+          <a:lstStyle/>
+          <a:p>
+            <a:r>
+              <a:rPr lang="en-US" sz="1200" b="1" dirty="0">
+                <a:solidFill>
+                  <a:srgbClr val="7030A0"/>
+                </a:solidFill>
+              </a:rPr>
+              <a:t>Model</a:t>
+            </a:r>
+            <a:endParaRPr lang="en-SG" sz="1200" b="1" dirty="0">
+              <a:solidFill>
+                <a:srgbClr val="7030A0"/>
+              </a:solidFill>
+            </a:endParaRPr>
+          </a:p>
+        </p:txBody>
+      </p:sp>
+      <p:cxnSp>
+        <p:nvCxnSpPr>
+          <p:cNvPr id="46" name="Straight Connector 45">
+            <a:extLst>
+              <a:ext uri="{FF2B5EF4-FFF2-40B4-BE49-F238E27FC236}">
+                <a16:creationId xmlns:a16="http://schemas.microsoft.com/office/drawing/2014/main" id="{9AC43E45-9F38-8746-944C-0794CB9B1502}"/>
+              </a:ext>
+            </a:extLst>
+          </p:cNvPr>
+          <p:cNvCxnSpPr>
+            <a:cxnSpLocks/>
+          </p:cNvCxnSpPr>
+          <p:nvPr/>
+        </p:nvCxnSpPr>
+        <p:spPr>
+          <a:xfrm>
+            <a:off x="13985077" y="17519248"/>
+            <a:ext cx="112169" cy="7741413"/>
+          </a:xfrm>
+          <a:prstGeom prst="line">
+            <a:avLst/>
+          </a:prstGeom>
+          <a:ln w="19050">
+            <a:solidFill>
+              <a:srgbClr val="0070C0"/>
+            </a:solidFill>
+            <a:prstDash val="sysDash"/>
+          </a:ln>
+          <a:effectLst/>
+        </p:spPr>
+        <p:style>
+          <a:lnRef idx="1">
+            <a:schemeClr val="accent1"/>
+          </a:lnRef>
+          <a:fillRef idx="2">
+            <a:schemeClr val="accent1"/>
+          </a:fillRef>
+          <a:effectRef idx="1">
+            <a:schemeClr val="accent1"/>
+          </a:effectRef>
+          <a:fontRef idx="minor">
+            <a:schemeClr val="dk1"/>
+          </a:fontRef>
+        </p:style>
+      </p:cxnSp>
+      <p:sp>
+        <p:nvSpPr>
+          <p:cNvPr id="4" name="Rectangle 62">
+            <a:extLst>
+              <a:ext uri="{FF2B5EF4-FFF2-40B4-BE49-F238E27FC236}">
+                <a16:creationId xmlns:a16="http://schemas.microsoft.com/office/drawing/2014/main" id="{49356493-13C9-E24F-977D-BDCF33F97956}"/>
+              </a:ext>
+            </a:extLst>
+          </p:cNvPr>
+          <p:cNvSpPr/>
+          <p:nvPr/>
+        </p:nvSpPr>
+        <p:spPr>
+          <a:xfrm>
+            <a:off x="5075437" y="15191015"/>
+            <a:ext cx="1455629" cy="346760"/>
+          </a:xfrm>
+          <a:prstGeom prst="rect">
+            <a:avLst/>
+          </a:prstGeom>
+          <a:solidFill>
+            <a:srgbClr val="0070C0"/>
+          </a:solidFill>
+          <a:ln w="19050">
+            <a:solidFill>
+              <a:srgbClr val="0070C0"/>
+            </a:solidFill>
+          </a:ln>
+          <a:effectLst/>
+        </p:spPr>
+        <p:style>
+          <a:lnRef idx="1">
+            <a:schemeClr val="accent2"/>
+          </a:lnRef>
+          <a:fillRef idx="2">
+            <a:schemeClr val="accent2"/>
+          </a:fillRef>
+          <a:effectRef idx="1">
+            <a:schemeClr val="accent2"/>
+          </a:effectRef>
+          <a:fontRef idx="minor">
+            <a:schemeClr val="dk1"/>
+          </a:fontRef>
+        </p:style>
+        <p:txBody>
+          <a:bodyPr rtlCol="0" anchor="ctr"/>
+          <a:lstStyle/>
+          <a:p>
+            <a:pPr algn="ctr"/>
+            <a:r>
+              <a:rPr lang="en-US" sz="1600" dirty="0">
+                <a:solidFill>
+                  <a:schemeClr val="bg1"/>
+                </a:solidFill>
+              </a:rPr>
+              <a:t>:LogicManager</a:t>
+            </a:r>
+            <a:endParaRPr lang="en-SG" sz="1600" dirty="0">
+              <a:solidFill>
+                <a:schemeClr val="bg1"/>
+              </a:solidFill>
+            </a:endParaRPr>
+          </a:p>
+        </p:txBody>
+      </p:sp>
+      <p:cxnSp>
+        <p:nvCxnSpPr>
+          <p:cNvPr id="5" name="Straight Connector 4">
+            <a:extLst>
+              <a:ext uri="{FF2B5EF4-FFF2-40B4-BE49-F238E27FC236}">
+                <a16:creationId xmlns:a16="http://schemas.microsoft.com/office/drawing/2014/main" id="{4465D61C-F5C6-0945-9BAA-0479167F101D}"/>
+              </a:ext>
+            </a:extLst>
+          </p:cNvPr>
+          <p:cNvCxnSpPr>
+            <a:cxnSpLocks/>
+          </p:cNvCxnSpPr>
+          <p:nvPr/>
+        </p:nvCxnSpPr>
+        <p:spPr>
+          <a:xfrm>
+            <a:off x="5803251" y="15494933"/>
+            <a:ext cx="0" cy="10277336"/>
+          </a:xfrm>
+          <a:prstGeom prst="line">
+            <a:avLst/>
+          </a:prstGeom>
+          <a:ln w="19050">
+            <a:solidFill>
+              <a:srgbClr val="0070C0"/>
+            </a:solidFill>
+            <a:prstDash val="sysDash"/>
+          </a:ln>
+          <a:effectLst/>
+        </p:spPr>
+        <p:style>
+          <a:lnRef idx="1">
+            <a:schemeClr val="accent1"/>
+          </a:lnRef>
+          <a:fillRef idx="2">
+            <a:schemeClr val="accent1"/>
+          </a:fillRef>
+          <a:effectRef idx="1">
+            <a:schemeClr val="accent1"/>
+          </a:effectRef>
+          <a:fontRef idx="minor">
+            <a:schemeClr val="dk1"/>
+          </a:fontRef>
+        </p:style>
+      </p:cxnSp>
+      <p:sp>
+        <p:nvSpPr>
+          <p:cNvPr id="6" name="Rectangle 5">
+            <a:extLst>
+              <a:ext uri="{FF2B5EF4-FFF2-40B4-BE49-F238E27FC236}">
+                <a16:creationId xmlns:a16="http://schemas.microsoft.com/office/drawing/2014/main" id="{5AB7DFFB-39D4-5243-8E99-23F8C348BDE2}"/>
+              </a:ext>
+            </a:extLst>
+          </p:cNvPr>
+          <p:cNvSpPr/>
+          <p:nvPr/>
+        </p:nvSpPr>
+        <p:spPr>
+          <a:xfrm>
+            <a:off x="5731669" y="16018668"/>
+            <a:ext cx="156556" cy="9241983"/>
+          </a:xfrm>
+          <a:prstGeom prst="rect">
+            <a:avLst/>
+          </a:prstGeom>
+          <a:solidFill>
+            <a:srgbClr val="0070C0"/>
+          </a:solidFill>
+          <a:ln>
+            <a:solidFill>
+              <a:srgbClr val="0070C0"/>
+            </a:solidFill>
+          </a:ln>
+          <a:effectLst/>
+        </p:spPr>
+        <p:style>
+          <a:lnRef idx="1">
+            <a:schemeClr val="accent3"/>
+          </a:lnRef>
+          <a:fillRef idx="2">
+            <a:schemeClr val="accent3"/>
+          </a:fillRef>
+          <a:effectRef idx="1">
+            <a:schemeClr val="accent3"/>
+          </a:effectRef>
+          <a:fontRef idx="minor">
+            <a:schemeClr val="dk1"/>
+          </a:fontRef>
+        </p:style>
+        <p:txBody>
+          <a:bodyPr rtlCol="0" anchor="ctr"/>
+          <a:lstStyle/>
+          <a:p>
+            <a:pPr algn="ctr"/>
+            <a:endParaRPr lang="en-SG" sz="1400"/>
+          </a:p>
+        </p:txBody>
+      </p:sp>
+      <p:sp>
+        <p:nvSpPr>
+          <p:cNvPr id="7" name="TextBox 6">
+            <a:extLst>
+              <a:ext uri="{FF2B5EF4-FFF2-40B4-BE49-F238E27FC236}">
+                <a16:creationId xmlns:a16="http://schemas.microsoft.com/office/drawing/2014/main" id="{2B18473A-68E6-AD46-B6F1-D40051B571D6}"/>
+              </a:ext>
+            </a:extLst>
+          </p:cNvPr>
+          <p:cNvSpPr txBox="1"/>
+          <p:nvPr/>
+        </p:nvSpPr>
+        <p:spPr>
+          <a:xfrm>
+            <a:off x="2682109" y="16116571"/>
+            <a:ext cx="3011399" cy="461665"/>
+          </a:xfrm>
+          <a:prstGeom prst="rect">
+            <a:avLst/>
+          </a:prstGeom>
+          <a:noFill/>
+        </p:spPr>
+        <p:txBody>
+          <a:bodyPr wrap="square" lIns="0" tIns="0" rIns="0" bIns="0" rtlCol="0">
+            <a:spAutoFit/>
+          </a:bodyPr>
+          <a:lstStyle/>
+          <a:p>
+            <a:pPr algn="r"/>
+            <a:r>
+              <a:rPr lang="en-US" sz="1000" dirty="0">
+                <a:solidFill>
+                  <a:srgbClr val="0070C0"/>
+                </a:solidFill>
+              </a:rPr>
+              <a:t>execute(“</a:t>
+            </a:r>
+            <a:r>
+              <a:rPr lang="en-GB" sz="1000" dirty="0">
+                <a:solidFill>
+                  <a:srgbClr val="0070C0"/>
+                </a:solidFill>
+              </a:rPr>
+              <a:t>add-e n/Pending CC pm/01-05-2019 p/99887766 a/8 Pending Rd, Singapore 678295 s/XDH1429387 t/north-west</a:t>
+            </a:r>
+            <a:r>
+              <a:rPr lang="en-US" sz="1000" dirty="0">
+                <a:solidFill>
+                  <a:srgbClr val="0070C0"/>
+                </a:solidFill>
+              </a:rPr>
+              <a:t>”)</a:t>
+            </a:r>
+          </a:p>
+        </p:txBody>
+      </p:sp>
+      <p:cxnSp>
+        <p:nvCxnSpPr>
+          <p:cNvPr id="8" name="Straight Arrow Connector 7">
+            <a:extLst>
+              <a:ext uri="{FF2B5EF4-FFF2-40B4-BE49-F238E27FC236}">
+                <a16:creationId xmlns:a16="http://schemas.microsoft.com/office/drawing/2014/main" id="{563AE8A0-3A2D-4B4B-9DB1-DA77728DFF7E}"/>
+              </a:ext>
+            </a:extLst>
+          </p:cNvPr>
+          <p:cNvCxnSpPr>
+            <a:cxnSpLocks/>
+          </p:cNvCxnSpPr>
+          <p:nvPr/>
+        </p:nvCxnSpPr>
+        <p:spPr>
+          <a:xfrm>
+            <a:off x="4131469" y="16018669"/>
+            <a:ext cx="1600200" cy="0"/>
+          </a:xfrm>
+          <a:prstGeom prst="straightConnector1">
+            <a:avLst/>
+          </a:prstGeom>
+          <a:ln w="19050">
+            <a:solidFill>
+              <a:schemeClr val="accent1"/>
+            </a:solidFill>
+            <a:tailEnd type="arrow"/>
+          </a:ln>
+        </p:spPr>
+        <p:style>
+          <a:lnRef idx="1">
+            <a:schemeClr val="accent1"/>
+          </a:lnRef>
+          <a:fillRef idx="0">
+            <a:schemeClr val="accent1"/>
+          </a:fillRef>
+          <a:effectRef idx="0">
+            <a:schemeClr val="accent1"/>
+          </a:effectRef>
+          <a:fontRef idx="minor">
+            <a:schemeClr val="tx1"/>
+          </a:fontRef>
+        </p:style>
+      </p:cxnSp>
+      <p:sp>
+        <p:nvSpPr>
+          <p:cNvPr id="9" name="Rectangle 62">
+            <a:extLst>
+              <a:ext uri="{FF2B5EF4-FFF2-40B4-BE49-F238E27FC236}">
+                <a16:creationId xmlns:a16="http://schemas.microsoft.com/office/drawing/2014/main" id="{A5B16113-BEB7-EB45-A2DE-A2DE59258BA9}"/>
+              </a:ext>
+            </a:extLst>
+          </p:cNvPr>
+          <p:cNvSpPr/>
+          <p:nvPr/>
+        </p:nvSpPr>
+        <p:spPr>
+          <a:xfrm>
+            <a:off x="7263634" y="15193828"/>
+            <a:ext cx="1880779" cy="512456"/>
+          </a:xfrm>
+          <a:prstGeom prst="rect">
+            <a:avLst/>
+          </a:prstGeom>
+          <a:solidFill>
+            <a:srgbClr val="0070C0"/>
+          </a:solidFill>
+          <a:ln w="19050">
+            <a:solidFill>
+              <a:srgbClr val="0070C0"/>
+            </a:solidFill>
+          </a:ln>
+          <a:effectLst/>
+        </p:spPr>
+        <p:style>
+          <a:lnRef idx="1">
+            <a:schemeClr val="accent2"/>
+          </a:lnRef>
+          <a:fillRef idx="2">
+            <a:schemeClr val="accent2"/>
+          </a:fillRef>
+          <a:effectRef idx="1">
+            <a:schemeClr val="accent2"/>
+          </a:effectRef>
+          <a:fontRef idx="minor">
+            <a:schemeClr val="dk1"/>
+          </a:fontRef>
+        </p:style>
+        <p:txBody>
+          <a:bodyPr rtlCol="0" anchor="ctr"/>
+          <a:lstStyle/>
+          <a:p>
+            <a:pPr algn="ctr"/>
+            <a:r>
+              <a:rPr lang="en-US" sz="1600" dirty="0">
+                <a:solidFill>
+                  <a:schemeClr val="bg1"/>
+                </a:solidFill>
+              </a:rPr>
+              <a:t>:EquipmentManagerParser</a:t>
+            </a:r>
+            <a:endParaRPr lang="en-SG" sz="1600" dirty="0">
+              <a:solidFill>
+                <a:schemeClr val="bg1"/>
+              </a:solidFill>
+            </a:endParaRPr>
+          </a:p>
+        </p:txBody>
+      </p:sp>
+      <p:cxnSp>
+        <p:nvCxnSpPr>
+          <p:cNvPr id="10" name="Straight Connector 9">
+            <a:extLst>
+              <a:ext uri="{FF2B5EF4-FFF2-40B4-BE49-F238E27FC236}">
+                <a16:creationId xmlns:a16="http://schemas.microsoft.com/office/drawing/2014/main" id="{FF9D7DD7-CCBE-AB40-8A98-3CC173DC2776}"/>
+              </a:ext>
+            </a:extLst>
+          </p:cNvPr>
+          <p:cNvCxnSpPr>
+            <a:cxnSpLocks/>
+          </p:cNvCxnSpPr>
+          <p:nvPr/>
+        </p:nvCxnSpPr>
+        <p:spPr>
+          <a:xfrm>
+            <a:off x="8219885" y="15627552"/>
+            <a:ext cx="0" cy="9916117"/>
+          </a:xfrm>
+          <a:prstGeom prst="line">
+            <a:avLst/>
+          </a:prstGeom>
+          <a:ln w="19050">
+            <a:solidFill>
+              <a:srgbClr val="0070C0"/>
+            </a:solidFill>
+            <a:prstDash val="sysDash"/>
+          </a:ln>
+          <a:effectLst/>
+        </p:spPr>
+        <p:style>
+          <a:lnRef idx="1">
+            <a:schemeClr val="accent1"/>
+          </a:lnRef>
+          <a:fillRef idx="2">
+            <a:schemeClr val="accent1"/>
+          </a:fillRef>
+          <a:effectRef idx="1">
+            <a:schemeClr val="accent1"/>
+          </a:effectRef>
+          <a:fontRef idx="minor">
+            <a:schemeClr val="dk1"/>
+          </a:fontRef>
+        </p:style>
+      </p:cxnSp>
+      <p:sp>
+        <p:nvSpPr>
+          <p:cNvPr id="11" name="Rectangle 10">
+            <a:extLst>
+              <a:ext uri="{FF2B5EF4-FFF2-40B4-BE49-F238E27FC236}">
+                <a16:creationId xmlns:a16="http://schemas.microsoft.com/office/drawing/2014/main" id="{CECECC39-35E5-7D4B-BA41-66FC3CAF564F}"/>
+              </a:ext>
+            </a:extLst>
+          </p:cNvPr>
+          <p:cNvSpPr/>
+          <p:nvPr/>
+        </p:nvSpPr>
+        <p:spPr>
+          <a:xfrm>
+            <a:off x="8143687" y="16182475"/>
+            <a:ext cx="156567" cy="4578577"/>
+          </a:xfrm>
+          <a:prstGeom prst="rect">
+            <a:avLst/>
+          </a:prstGeom>
+          <a:solidFill>
+            <a:srgbClr val="0070C0"/>
+          </a:solidFill>
+          <a:ln>
+            <a:solidFill>
+              <a:srgbClr val="0070C0"/>
+            </a:solidFill>
+          </a:ln>
+          <a:effectLst/>
+        </p:spPr>
+        <p:style>
+          <a:lnRef idx="1">
+            <a:schemeClr val="accent3"/>
+          </a:lnRef>
+          <a:fillRef idx="2">
+            <a:schemeClr val="accent3"/>
+          </a:fillRef>
+          <a:effectRef idx="1">
+            <a:schemeClr val="accent3"/>
+          </a:effectRef>
+          <a:fontRef idx="minor">
+            <a:schemeClr val="dk1"/>
+          </a:fontRef>
+        </p:style>
+        <p:txBody>
+          <a:bodyPr rtlCol="0" anchor="ctr"/>
+          <a:lstStyle/>
+          <a:p>
+            <a:pPr algn="ctr"/>
+            <a:endParaRPr lang="en-SG" sz="1400"/>
+          </a:p>
+        </p:txBody>
+      </p:sp>
+      <p:cxnSp>
+        <p:nvCxnSpPr>
+          <p:cNvPr id="12" name="Straight Arrow Connector 11">
+            <a:extLst>
+              <a:ext uri="{FF2B5EF4-FFF2-40B4-BE49-F238E27FC236}">
+                <a16:creationId xmlns:a16="http://schemas.microsoft.com/office/drawing/2014/main" id="{070CE975-3F0F-C14D-A39B-A16308917498}"/>
+              </a:ext>
+            </a:extLst>
+          </p:cNvPr>
+          <p:cNvCxnSpPr>
+            <a:cxnSpLocks/>
+          </p:cNvCxnSpPr>
+          <p:nvPr/>
+        </p:nvCxnSpPr>
+        <p:spPr>
+          <a:xfrm>
+            <a:off x="5875892" y="20764827"/>
+            <a:ext cx="2348067" cy="0"/>
+          </a:xfrm>
+          <a:prstGeom prst="straightConnector1">
+            <a:avLst/>
+          </a:prstGeom>
+          <a:ln w="19050">
+            <a:solidFill>
+              <a:srgbClr val="0070C0"/>
+            </a:solidFill>
+            <a:prstDash val="sysDash"/>
+            <a:headEnd type="arrow" w="med" len="med"/>
+            <a:tailEnd type="none" w="med" len="med"/>
+          </a:ln>
+        </p:spPr>
+        <p:style>
+          <a:lnRef idx="1">
+            <a:schemeClr val="accent1"/>
+          </a:lnRef>
+          <a:fillRef idx="0">
+            <a:schemeClr val="accent1"/>
+          </a:fillRef>
+          <a:effectRef idx="0">
+            <a:schemeClr val="accent1"/>
+          </a:effectRef>
+          <a:fontRef idx="minor">
+            <a:schemeClr val="tx1"/>
+          </a:fontRef>
+        </p:style>
+      </p:cxnSp>
+      <p:sp>
+        <p:nvSpPr>
+          <p:cNvPr id="13" name="TextBox 12">
+            <a:extLst>
+              <a:ext uri="{FF2B5EF4-FFF2-40B4-BE49-F238E27FC236}">
+                <a16:creationId xmlns:a16="http://schemas.microsoft.com/office/drawing/2014/main" id="{FD761C3E-5D59-3940-AA2C-5ECA0ACA2DA4}"/>
+              </a:ext>
+            </a:extLst>
+          </p:cNvPr>
+          <p:cNvSpPr txBox="1"/>
+          <p:nvPr/>
+        </p:nvSpPr>
+        <p:spPr>
+          <a:xfrm>
+            <a:off x="6154825" y="16269942"/>
+            <a:ext cx="1880779" cy="615553"/>
+          </a:xfrm>
+          <a:prstGeom prst="rect">
+            <a:avLst/>
+          </a:prstGeom>
+          <a:noFill/>
+        </p:spPr>
+        <p:txBody>
+          <a:bodyPr wrap="square" lIns="0" tIns="0" rIns="0" bIns="0" rtlCol="0">
+            <a:spAutoFit/>
+          </a:bodyPr>
+          <a:lstStyle>
+            <a:defPPr>
+              <a:defRPr lang="en-US"/>
+            </a:defPPr>
+            <a:lvl1pPr algn="r">
+              <a:defRPr sz="1400">
+                <a:solidFill>
+                  <a:srgbClr val="0070C0"/>
+                </a:solidFill>
+              </a:defRPr>
+            </a:lvl1pPr>
+          </a:lstStyle>
+          <a:p>
+            <a:r>
+              <a:rPr lang="en-US" sz="1000" dirty="0"/>
+              <a:t>parseCommand(“</a:t>
+            </a:r>
+            <a:r>
+              <a:rPr lang="en-GB" sz="1000" dirty="0"/>
+              <a:t>add-e n/Pending CC pm/01-05-2019 p/99887766 a/8 Pending Rd, Singapore 678295 s/XDH1429387 t/north-west</a:t>
+            </a:r>
+            <a:r>
+              <a:rPr lang="en-US" sz="1000" dirty="0"/>
+              <a:t>”)</a:t>
+            </a:r>
+          </a:p>
+        </p:txBody>
+      </p:sp>
+      <p:sp>
+        <p:nvSpPr>
+          <p:cNvPr id="14" name="TextBox 13">
+            <a:extLst>
+              <a:ext uri="{FF2B5EF4-FFF2-40B4-BE49-F238E27FC236}">
+                <a16:creationId xmlns:a16="http://schemas.microsoft.com/office/drawing/2014/main" id="{14755BA1-B330-CB41-83D8-E4AADBF0E20F}"/>
+              </a:ext>
+            </a:extLst>
+          </p:cNvPr>
+          <p:cNvSpPr txBox="1"/>
+          <p:nvPr/>
+        </p:nvSpPr>
+        <p:spPr>
+          <a:xfrm>
+            <a:off x="6906077" y="20532450"/>
+            <a:ext cx="220343" cy="215444"/>
+          </a:xfrm>
+          <a:prstGeom prst="rect">
+            <a:avLst/>
+          </a:prstGeom>
+          <a:noFill/>
+        </p:spPr>
+        <p:txBody>
+          <a:bodyPr wrap="square" lIns="0" tIns="0" rIns="0" bIns="0" rtlCol="0">
+            <a:spAutoFit/>
+          </a:bodyPr>
+          <a:lstStyle>
+            <a:defPPr>
+              <a:defRPr lang="en-US"/>
+            </a:defPPr>
+            <a:lvl1pPr algn="r">
+              <a:defRPr sz="1400">
+                <a:solidFill>
+                  <a:srgbClr val="0070C0"/>
+                </a:solidFill>
+              </a:defRPr>
+            </a:lvl1pPr>
+          </a:lstStyle>
+          <a:p>
+            <a:r>
+              <a:rPr lang="en-US" dirty="0"/>
+              <a:t>u</a:t>
+            </a:r>
+          </a:p>
+        </p:txBody>
+      </p:sp>
+      <p:cxnSp>
+        <p:nvCxnSpPr>
+          <p:cNvPr id="15" name="Straight Arrow Connector 14">
+            <a:extLst>
+              <a:ext uri="{FF2B5EF4-FFF2-40B4-BE49-F238E27FC236}">
+                <a16:creationId xmlns:a16="http://schemas.microsoft.com/office/drawing/2014/main" id="{0785AA57-199C-C940-A95F-ABB63BC340F8}"/>
+              </a:ext>
+            </a:extLst>
+          </p:cNvPr>
+          <p:cNvCxnSpPr>
+            <a:cxnSpLocks/>
+          </p:cNvCxnSpPr>
+          <p:nvPr/>
+        </p:nvCxnSpPr>
+        <p:spPr>
+          <a:xfrm>
+            <a:off x="5889531" y="16189051"/>
+            <a:ext cx="2256705" cy="1"/>
+          </a:xfrm>
+          <a:prstGeom prst="straightConnector1">
+            <a:avLst/>
+          </a:prstGeom>
+          <a:ln w="19050">
+            <a:solidFill>
+              <a:srgbClr val="0070C0"/>
+            </a:solidFill>
+            <a:tailEnd type="arrow"/>
+          </a:ln>
+        </p:spPr>
+        <p:style>
+          <a:lnRef idx="1">
+            <a:schemeClr val="accent1"/>
+          </a:lnRef>
+          <a:fillRef idx="0">
+            <a:schemeClr val="accent1"/>
+          </a:fillRef>
+          <a:effectRef idx="0">
+            <a:schemeClr val="accent1"/>
+          </a:effectRef>
+          <a:fontRef idx="minor">
+            <a:schemeClr val="tx1"/>
+          </a:fontRef>
+        </p:style>
+      </p:cxnSp>
+      <p:sp>
+        <p:nvSpPr>
+          <p:cNvPr id="16" name="Rectangle 15">
+            <a:extLst>
+              <a:ext uri="{FF2B5EF4-FFF2-40B4-BE49-F238E27FC236}">
+                <a16:creationId xmlns:a16="http://schemas.microsoft.com/office/drawing/2014/main" id="{68FC7368-E87E-D645-BCB3-BF05344CA144}"/>
+              </a:ext>
+            </a:extLst>
+          </p:cNvPr>
+          <p:cNvSpPr/>
+          <p:nvPr/>
+        </p:nvSpPr>
+        <p:spPr>
+          <a:xfrm>
+            <a:off x="10229057" y="16621303"/>
+            <a:ext cx="154202" cy="273146"/>
+          </a:xfrm>
+          <a:prstGeom prst="rect">
+            <a:avLst/>
+          </a:prstGeom>
+          <a:solidFill>
+            <a:srgbClr val="0070C0"/>
+          </a:solidFill>
+          <a:ln>
+            <a:solidFill>
+              <a:srgbClr val="0070C0"/>
+            </a:solidFill>
+          </a:ln>
+          <a:effectLst/>
+        </p:spPr>
+        <p:style>
+          <a:lnRef idx="1">
+            <a:schemeClr val="accent3"/>
+          </a:lnRef>
+          <a:fillRef idx="2">
+            <a:schemeClr val="accent3"/>
+          </a:fillRef>
+          <a:effectRef idx="1">
+            <a:schemeClr val="accent3"/>
+          </a:effectRef>
+          <a:fontRef idx="minor">
+            <a:schemeClr val="dk1"/>
+          </a:fontRef>
+        </p:style>
+        <p:txBody>
+          <a:bodyPr rtlCol="0" anchor="ctr"/>
+          <a:lstStyle/>
+          <a:p>
+            <a:pPr algn="ctr"/>
+            <a:endParaRPr lang="en-SG" sz="1400"/>
+          </a:p>
+        </p:txBody>
+      </p:sp>
+      <p:cxnSp>
+        <p:nvCxnSpPr>
+          <p:cNvPr id="17" name="Straight Arrow Connector 16">
+            <a:extLst>
+              <a:ext uri="{FF2B5EF4-FFF2-40B4-BE49-F238E27FC236}">
+                <a16:creationId xmlns:a16="http://schemas.microsoft.com/office/drawing/2014/main" id="{C61A5F7C-3168-C34F-8007-745CF8168A8C}"/>
+              </a:ext>
+            </a:extLst>
+          </p:cNvPr>
+          <p:cNvCxnSpPr>
+            <a:cxnSpLocks/>
+          </p:cNvCxnSpPr>
+          <p:nvPr/>
+        </p:nvCxnSpPr>
+        <p:spPr>
+          <a:xfrm>
+            <a:off x="8291773" y="16412173"/>
+            <a:ext cx="1164577" cy="0"/>
+          </a:xfrm>
+          <a:prstGeom prst="straightConnector1">
+            <a:avLst/>
+          </a:prstGeom>
+          <a:ln w="19050">
+            <a:solidFill>
+              <a:srgbClr val="0070C0"/>
+            </a:solidFill>
+            <a:tailEnd type="arrow"/>
+          </a:ln>
+        </p:spPr>
+        <p:style>
+          <a:lnRef idx="1">
+            <a:schemeClr val="accent1"/>
+          </a:lnRef>
+          <a:fillRef idx="0">
+            <a:schemeClr val="accent1"/>
+          </a:fillRef>
+          <a:effectRef idx="0">
+            <a:schemeClr val="accent1"/>
+          </a:effectRef>
+          <a:fontRef idx="minor">
+            <a:schemeClr val="tx1"/>
+          </a:fontRef>
+        </p:style>
+      </p:cxnSp>
+      <p:cxnSp>
+        <p:nvCxnSpPr>
+          <p:cNvPr id="18" name="Straight Arrow Connector 17">
+            <a:extLst>
+              <a:ext uri="{FF2B5EF4-FFF2-40B4-BE49-F238E27FC236}">
+                <a16:creationId xmlns:a16="http://schemas.microsoft.com/office/drawing/2014/main" id="{FCA27DD3-A142-1D49-9F24-53722784EA9B}"/>
+              </a:ext>
+            </a:extLst>
+          </p:cNvPr>
+          <p:cNvCxnSpPr>
+            <a:cxnSpLocks/>
+          </p:cNvCxnSpPr>
+          <p:nvPr/>
+        </p:nvCxnSpPr>
+        <p:spPr>
+          <a:xfrm>
+            <a:off x="8263312" y="16894938"/>
+            <a:ext cx="1957926" cy="0"/>
+          </a:xfrm>
+          <a:prstGeom prst="straightConnector1">
+            <a:avLst/>
+          </a:prstGeom>
+          <a:ln w="19050">
+            <a:solidFill>
+              <a:srgbClr val="0070C0"/>
+            </a:solidFill>
+            <a:prstDash val="sysDash"/>
+            <a:headEnd type="arrow" w="med" len="med"/>
+            <a:tailEnd type="none" w="med" len="med"/>
+          </a:ln>
+        </p:spPr>
+        <p:style>
+          <a:lnRef idx="1">
+            <a:schemeClr val="accent1"/>
+          </a:lnRef>
+          <a:fillRef idx="0">
+            <a:schemeClr val="accent1"/>
+          </a:fillRef>
+          <a:effectRef idx="0">
+            <a:schemeClr val="accent1"/>
+          </a:effectRef>
+          <a:fontRef idx="minor">
+            <a:schemeClr val="tx1"/>
+          </a:fontRef>
+        </p:style>
+      </p:cxnSp>
+      <p:sp>
+        <p:nvSpPr>
+          <p:cNvPr id="19" name="Rectangle 62">
+            <a:extLst>
+              <a:ext uri="{FF2B5EF4-FFF2-40B4-BE49-F238E27FC236}">
+                <a16:creationId xmlns:a16="http://schemas.microsoft.com/office/drawing/2014/main" id="{4BB6A0C5-B7F1-0B4F-B88C-1DB6C6E0BFBE}"/>
+              </a:ext>
+            </a:extLst>
+          </p:cNvPr>
+          <p:cNvSpPr/>
+          <p:nvPr/>
+        </p:nvSpPr>
+        <p:spPr>
+          <a:xfrm>
+            <a:off x="9434771" y="16182475"/>
+            <a:ext cx="1599786" cy="459399"/>
+          </a:xfrm>
+          <a:prstGeom prst="rect">
+            <a:avLst/>
+          </a:prstGeom>
+          <a:solidFill>
+            <a:srgbClr val="0070C0"/>
+          </a:solidFill>
+          <a:ln w="19050">
+            <a:solidFill>
+              <a:srgbClr val="0070C0"/>
+            </a:solidFill>
+          </a:ln>
+          <a:effectLst/>
+        </p:spPr>
+        <p:style>
+          <a:lnRef idx="1">
+            <a:schemeClr val="accent2"/>
+          </a:lnRef>
+          <a:fillRef idx="2">
+            <a:schemeClr val="accent2"/>
+          </a:fillRef>
+          <a:effectRef idx="1">
+            <a:schemeClr val="accent2"/>
+          </a:effectRef>
+          <a:fontRef idx="minor">
+            <a:schemeClr val="dk1"/>
+          </a:fontRef>
+        </p:style>
+        <p:txBody>
+          <a:bodyPr rtlCol="0" anchor="ctr"/>
+          <a:lstStyle/>
+          <a:p>
+            <a:pPr algn="ctr"/>
+            <a:r>
+              <a:rPr lang="en-US" sz="1600" dirty="0">
+                <a:solidFill>
+                  <a:schemeClr val="bg1"/>
+                </a:solidFill>
+              </a:rPr>
+              <a:t>:Add</a:t>
+            </a:r>
+            <a:br>
+              <a:rPr lang="en-US" sz="1600" dirty="0">
+                <a:solidFill>
+                  <a:schemeClr val="bg1"/>
+                </a:solidFill>
+              </a:rPr>
+            </a:br>
+            <a:r>
+              <a:rPr lang="en-US" sz="1600" dirty="0">
+                <a:solidFill>
+                  <a:schemeClr val="bg1"/>
+                </a:solidFill>
+              </a:rPr>
+              <a:t>CommandParser</a:t>
+            </a:r>
+            <a:endParaRPr lang="en-SG" sz="1600" dirty="0">
+              <a:solidFill>
+                <a:schemeClr val="bg1"/>
+              </a:solidFill>
+            </a:endParaRPr>
+          </a:p>
+        </p:txBody>
+      </p:sp>
+      <p:sp>
+        <p:nvSpPr>
+          <p:cNvPr id="20" name="TextBox 19">
+            <a:extLst>
+              <a:ext uri="{FF2B5EF4-FFF2-40B4-BE49-F238E27FC236}">
+                <a16:creationId xmlns:a16="http://schemas.microsoft.com/office/drawing/2014/main" id="{9CC879D4-DE96-B148-8D49-893003D73980}"/>
+              </a:ext>
+            </a:extLst>
+          </p:cNvPr>
+          <p:cNvSpPr txBox="1"/>
+          <p:nvPr/>
+        </p:nvSpPr>
+        <p:spPr>
+          <a:xfrm>
+            <a:off x="8291770" y="16903407"/>
+            <a:ext cx="1896451" cy="646331"/>
+          </a:xfrm>
+          <a:prstGeom prst="rect">
+            <a:avLst/>
+          </a:prstGeom>
+          <a:noFill/>
+        </p:spPr>
+        <p:txBody>
+          <a:bodyPr wrap="square" lIns="0" tIns="0" rIns="0" bIns="0" rtlCol="0">
+            <a:spAutoFit/>
+          </a:bodyPr>
+          <a:lstStyle>
+            <a:defPPr>
+              <a:defRPr lang="en-US"/>
+            </a:defPPr>
+            <a:lvl1pPr algn="r">
+              <a:defRPr sz="1400">
+                <a:solidFill>
+                  <a:srgbClr val="0070C0"/>
+                </a:solidFill>
+              </a:defRPr>
+            </a:lvl1pPr>
+          </a:lstStyle>
+          <a:p>
+            <a:r>
+              <a:rPr lang="en-US" sz="1050" dirty="0"/>
+              <a:t>parse(“</a:t>
+            </a:r>
+            <a:r>
+              <a:rPr lang="en-GB" sz="1050" dirty="0"/>
+              <a:t>add-e n/Pending CC pm/01-05-2019 p/99887766 a/8 Pending Rd, Singapore 678295 s/XDH1429387 t/north-west</a:t>
+            </a:r>
+            <a:r>
+              <a:rPr lang="en-US" sz="1050" dirty="0"/>
+              <a:t>”)</a:t>
+            </a:r>
+          </a:p>
+        </p:txBody>
+      </p:sp>
+      <p:cxnSp>
+        <p:nvCxnSpPr>
+          <p:cNvPr id="21" name="Straight Connector 20">
+            <a:extLst>
+              <a:ext uri="{FF2B5EF4-FFF2-40B4-BE49-F238E27FC236}">
+                <a16:creationId xmlns:a16="http://schemas.microsoft.com/office/drawing/2014/main" id="{5A0A97EF-E3C0-F24A-A42D-3A1C8F7ECE2A}"/>
+              </a:ext>
+            </a:extLst>
+          </p:cNvPr>
+          <p:cNvCxnSpPr>
+            <a:cxnSpLocks/>
+            <a:endCxn id="81" idx="0"/>
+          </p:cNvCxnSpPr>
+          <p:nvPr/>
+        </p:nvCxnSpPr>
+        <p:spPr>
+          <a:xfrm>
+            <a:off x="10303364" y="16800131"/>
+            <a:ext cx="18970" cy="6182499"/>
+          </a:xfrm>
+          <a:prstGeom prst="line">
+            <a:avLst/>
+          </a:prstGeom>
+          <a:ln w="19050">
+            <a:solidFill>
+              <a:srgbClr val="0070C0"/>
+            </a:solidFill>
+            <a:prstDash val="sysDash"/>
+          </a:ln>
+          <a:effectLst/>
+        </p:spPr>
+        <p:style>
+          <a:lnRef idx="1">
+            <a:schemeClr val="accent1"/>
+          </a:lnRef>
+          <a:fillRef idx="2">
+            <a:schemeClr val="accent1"/>
+          </a:fillRef>
+          <a:effectRef idx="1">
+            <a:schemeClr val="accent1"/>
+          </a:effectRef>
+          <a:fontRef idx="minor">
+            <a:schemeClr val="dk1"/>
+          </a:fontRef>
+        </p:style>
+      </p:cxnSp>
+      <p:sp>
+        <p:nvSpPr>
+          <p:cNvPr id="22" name="Rectangle 21">
+            <a:extLst>
+              <a:ext uri="{FF2B5EF4-FFF2-40B4-BE49-F238E27FC236}">
+                <a16:creationId xmlns:a16="http://schemas.microsoft.com/office/drawing/2014/main" id="{1990C53A-A806-AA4C-A054-9DDF98C08363}"/>
+              </a:ext>
+            </a:extLst>
+          </p:cNvPr>
+          <p:cNvSpPr/>
+          <p:nvPr/>
+        </p:nvSpPr>
+        <p:spPr>
+          <a:xfrm>
+            <a:off x="10215161" y="17655424"/>
+            <a:ext cx="179713" cy="5292772"/>
+          </a:xfrm>
+          <a:prstGeom prst="rect">
+            <a:avLst/>
+          </a:prstGeom>
+          <a:solidFill>
+            <a:srgbClr val="0070C0"/>
+          </a:solidFill>
+          <a:ln>
+            <a:solidFill>
+              <a:srgbClr val="0070C0"/>
+            </a:solidFill>
+          </a:ln>
+          <a:effectLst/>
+        </p:spPr>
+        <p:style>
+          <a:lnRef idx="1">
+            <a:schemeClr val="accent3"/>
+          </a:lnRef>
+          <a:fillRef idx="2">
+            <a:schemeClr val="accent3"/>
+          </a:fillRef>
+          <a:effectRef idx="1">
+            <a:schemeClr val="accent3"/>
+          </a:effectRef>
+          <a:fontRef idx="minor">
+            <a:schemeClr val="dk1"/>
+          </a:fontRef>
+        </p:style>
+        <p:txBody>
+          <a:bodyPr rtlCol="0" anchor="ctr"/>
+          <a:lstStyle/>
+          <a:p>
+            <a:pPr algn="ctr"/>
+            <a:endParaRPr lang="en-SG" sz="1400"/>
+          </a:p>
+        </p:txBody>
+      </p:sp>
+      <p:cxnSp>
+        <p:nvCxnSpPr>
+          <p:cNvPr id="23" name="Straight Arrow Connector 22">
+            <a:extLst>
+              <a:ext uri="{FF2B5EF4-FFF2-40B4-BE49-F238E27FC236}">
+                <a16:creationId xmlns:a16="http://schemas.microsoft.com/office/drawing/2014/main" id="{9CE19FFA-7F46-AF40-B76A-D5129C0C435D}"/>
+              </a:ext>
+            </a:extLst>
+          </p:cNvPr>
+          <p:cNvCxnSpPr>
+            <a:cxnSpLocks/>
+          </p:cNvCxnSpPr>
+          <p:nvPr/>
+        </p:nvCxnSpPr>
+        <p:spPr>
+          <a:xfrm>
+            <a:off x="8279981" y="17662930"/>
+            <a:ext cx="1935180" cy="5237"/>
+          </a:xfrm>
+          <a:prstGeom prst="straightConnector1">
+            <a:avLst/>
+          </a:prstGeom>
+          <a:ln w="19050">
+            <a:solidFill>
+              <a:srgbClr val="0070C0"/>
+            </a:solidFill>
+            <a:tailEnd type="arrow"/>
+          </a:ln>
+        </p:spPr>
+        <p:style>
+          <a:lnRef idx="1">
+            <a:schemeClr val="accent1"/>
+          </a:lnRef>
+          <a:fillRef idx="0">
+            <a:schemeClr val="accent1"/>
+          </a:fillRef>
+          <a:effectRef idx="0">
+            <a:schemeClr val="accent1"/>
+          </a:effectRef>
+          <a:fontRef idx="minor">
+            <a:schemeClr val="tx1"/>
+          </a:fontRef>
+        </p:style>
+      </p:cxnSp>
+      <p:sp>
+        <p:nvSpPr>
+          <p:cNvPr id="24" name="Rectangle 62">
+            <a:extLst>
+              <a:ext uri="{FF2B5EF4-FFF2-40B4-BE49-F238E27FC236}">
+                <a16:creationId xmlns:a16="http://schemas.microsoft.com/office/drawing/2014/main" id="{9734163D-1269-2C4B-A84D-5EE80F4C0B1F}"/>
+              </a:ext>
+            </a:extLst>
+          </p:cNvPr>
+          <p:cNvSpPr/>
+          <p:nvPr/>
+        </p:nvSpPr>
+        <p:spPr>
+          <a:xfrm>
+            <a:off x="11829350" y="15590047"/>
+            <a:ext cx="1880784" cy="609964"/>
+          </a:xfrm>
+          <a:prstGeom prst="rect">
+            <a:avLst/>
+          </a:prstGeom>
+          <a:solidFill>
+            <a:srgbClr val="0070C0"/>
+          </a:solidFill>
+          <a:ln w="19050">
+            <a:solidFill>
+              <a:srgbClr val="0070C0"/>
+            </a:solidFill>
+          </a:ln>
+          <a:effectLst/>
+        </p:spPr>
+        <p:style>
+          <a:lnRef idx="1">
+            <a:schemeClr val="accent2"/>
+          </a:lnRef>
+          <a:fillRef idx="2">
+            <a:schemeClr val="accent2"/>
+          </a:fillRef>
+          <a:effectRef idx="1">
+            <a:schemeClr val="accent2"/>
+          </a:effectRef>
+          <a:fontRef idx="minor">
+            <a:schemeClr val="dk1"/>
+          </a:fontRef>
+        </p:style>
+        <p:txBody>
+          <a:bodyPr rtlCol="0" anchor="ctr"/>
+          <a:lstStyle/>
+          <a:p>
+            <a:pPr algn="ctr"/>
+            <a:r>
+              <a:rPr lang="en-US" sz="1600" dirty="0">
+                <a:solidFill>
+                  <a:schemeClr val="bg1"/>
+                </a:solidFill>
+              </a:rPr>
+              <a:t>&lt;&lt;class&gt;&gt;</a:t>
+            </a:r>
+          </a:p>
+          <a:p>
+            <a:pPr algn="ctr"/>
+            <a:r>
+              <a:rPr lang="en-US" sz="1600" dirty="0">
+                <a:solidFill>
+                  <a:schemeClr val="bg1"/>
+                </a:solidFill>
+              </a:rPr>
+              <a:t>ArgumentTokenizer</a:t>
+            </a:r>
+            <a:endParaRPr lang="en-SG" sz="1600" dirty="0">
+              <a:solidFill>
+                <a:schemeClr val="bg1"/>
+              </a:solidFill>
+            </a:endParaRPr>
+          </a:p>
+        </p:txBody>
+      </p:sp>
+      <p:cxnSp>
+        <p:nvCxnSpPr>
+          <p:cNvPr id="25" name="Straight Connector 24">
+            <a:extLst>
+              <a:ext uri="{FF2B5EF4-FFF2-40B4-BE49-F238E27FC236}">
+                <a16:creationId xmlns:a16="http://schemas.microsoft.com/office/drawing/2014/main" id="{74A78704-3990-E04E-81EB-82008CF2BB84}"/>
+              </a:ext>
+            </a:extLst>
+          </p:cNvPr>
+          <p:cNvCxnSpPr>
+            <a:cxnSpLocks/>
+          </p:cNvCxnSpPr>
+          <p:nvPr/>
+        </p:nvCxnSpPr>
+        <p:spPr>
+          <a:xfrm>
+            <a:off x="12785603" y="16150733"/>
+            <a:ext cx="88729" cy="9109928"/>
+          </a:xfrm>
+          <a:prstGeom prst="line">
+            <a:avLst/>
+          </a:prstGeom>
+          <a:ln w="19050">
+            <a:solidFill>
+              <a:srgbClr val="0070C0"/>
+            </a:solidFill>
+            <a:prstDash val="sysDash"/>
+          </a:ln>
+          <a:effectLst/>
+        </p:spPr>
+        <p:style>
+          <a:lnRef idx="1">
+            <a:schemeClr val="accent1"/>
+          </a:lnRef>
+          <a:fillRef idx="2">
+            <a:schemeClr val="accent1"/>
+          </a:fillRef>
+          <a:effectRef idx="1">
+            <a:schemeClr val="accent1"/>
+          </a:effectRef>
+          <a:fontRef idx="minor">
+            <a:schemeClr val="dk1"/>
+          </a:fontRef>
+        </p:style>
+      </p:cxnSp>
+      <p:sp>
+        <p:nvSpPr>
+          <p:cNvPr id="26" name="Rectangle 25">
+            <a:extLst>
+              <a:ext uri="{FF2B5EF4-FFF2-40B4-BE49-F238E27FC236}">
+                <a16:creationId xmlns:a16="http://schemas.microsoft.com/office/drawing/2014/main" id="{5C5262EB-454E-4849-86CA-3383890A071E}"/>
+              </a:ext>
+            </a:extLst>
+          </p:cNvPr>
+          <p:cNvSpPr/>
+          <p:nvPr/>
+        </p:nvSpPr>
+        <p:spPr>
+          <a:xfrm>
+            <a:off x="12720130" y="17721811"/>
+            <a:ext cx="154202" cy="273146"/>
+          </a:xfrm>
+          <a:prstGeom prst="rect">
+            <a:avLst/>
+          </a:prstGeom>
+          <a:solidFill>
+            <a:srgbClr val="0070C0"/>
+          </a:solidFill>
+          <a:ln>
+            <a:solidFill>
+              <a:srgbClr val="0070C0"/>
+            </a:solidFill>
+          </a:ln>
+          <a:effectLst/>
+        </p:spPr>
+        <p:style>
+          <a:lnRef idx="1">
+            <a:schemeClr val="accent3"/>
+          </a:lnRef>
+          <a:fillRef idx="2">
+            <a:schemeClr val="accent3"/>
+          </a:fillRef>
+          <a:effectRef idx="1">
+            <a:schemeClr val="accent3"/>
+          </a:effectRef>
+          <a:fontRef idx="minor">
+            <a:schemeClr val="dk1"/>
+          </a:fontRef>
+        </p:style>
+        <p:txBody>
+          <a:bodyPr rtlCol="0" anchor="ctr"/>
+          <a:lstStyle/>
+          <a:p>
+            <a:pPr algn="ctr"/>
+            <a:endParaRPr lang="en-SG" sz="1400"/>
+          </a:p>
+        </p:txBody>
+      </p:sp>
+      <p:cxnSp>
+        <p:nvCxnSpPr>
+          <p:cNvPr id="29" name="Straight Arrow Connector 28">
+            <a:extLst>
+              <a:ext uri="{FF2B5EF4-FFF2-40B4-BE49-F238E27FC236}">
+                <a16:creationId xmlns:a16="http://schemas.microsoft.com/office/drawing/2014/main" id="{C94B6063-7823-A148-8A72-7C6339112D60}"/>
+              </a:ext>
+            </a:extLst>
+          </p:cNvPr>
+          <p:cNvCxnSpPr>
+            <a:cxnSpLocks/>
+          </p:cNvCxnSpPr>
+          <p:nvPr/>
+        </p:nvCxnSpPr>
+        <p:spPr>
+          <a:xfrm>
+            <a:off x="10364471" y="17995604"/>
+            <a:ext cx="2315735" cy="0"/>
+          </a:xfrm>
+          <a:prstGeom prst="straightConnector1">
+            <a:avLst/>
+          </a:prstGeom>
+          <a:ln w="19050">
+            <a:solidFill>
+              <a:srgbClr val="0070C0"/>
+            </a:solidFill>
+            <a:prstDash val="sysDash"/>
+            <a:headEnd type="arrow" w="med" len="med"/>
+            <a:tailEnd type="none" w="med" len="med"/>
+          </a:ln>
+        </p:spPr>
+        <p:style>
+          <a:lnRef idx="1">
+            <a:schemeClr val="accent1"/>
+          </a:lnRef>
+          <a:fillRef idx="0">
+            <a:schemeClr val="accent1"/>
+          </a:fillRef>
+          <a:effectRef idx="0">
+            <a:schemeClr val="accent1"/>
+          </a:effectRef>
+          <a:fontRef idx="minor">
+            <a:schemeClr val="tx1"/>
+          </a:fontRef>
+        </p:style>
+      </p:cxnSp>
+      <p:cxnSp>
+        <p:nvCxnSpPr>
+          <p:cNvPr id="30" name="Straight Arrow Connector 29">
+            <a:extLst>
+              <a:ext uri="{FF2B5EF4-FFF2-40B4-BE49-F238E27FC236}">
+                <a16:creationId xmlns:a16="http://schemas.microsoft.com/office/drawing/2014/main" id="{CD1A56D6-1D8D-044C-AFB1-A29D306FDF30}"/>
+              </a:ext>
+            </a:extLst>
+          </p:cNvPr>
+          <p:cNvCxnSpPr>
+            <a:cxnSpLocks/>
+          </p:cNvCxnSpPr>
+          <p:nvPr/>
+        </p:nvCxnSpPr>
+        <p:spPr>
+          <a:xfrm flipV="1">
+            <a:off x="10364471" y="17722457"/>
+            <a:ext cx="2337396" cy="1"/>
+          </a:xfrm>
+          <a:prstGeom prst="straightConnector1">
+            <a:avLst/>
+          </a:prstGeom>
+          <a:ln w="19050">
+            <a:solidFill>
+              <a:srgbClr val="0070C0"/>
+            </a:solidFill>
+            <a:tailEnd type="arrow"/>
+          </a:ln>
+        </p:spPr>
+        <p:style>
+          <a:lnRef idx="1">
+            <a:schemeClr val="accent1"/>
+          </a:lnRef>
+          <a:fillRef idx="0">
+            <a:schemeClr val="accent1"/>
+          </a:fillRef>
+          <a:effectRef idx="0">
+            <a:schemeClr val="accent1"/>
+          </a:effectRef>
+          <a:fontRef idx="minor">
+            <a:schemeClr val="tx1"/>
+          </a:fontRef>
+        </p:style>
+      </p:cxnSp>
+      <p:sp>
+        <p:nvSpPr>
+          <p:cNvPr id="31" name="Rectangle 62">
+            <a:extLst>
+              <a:ext uri="{FF2B5EF4-FFF2-40B4-BE49-F238E27FC236}">
+                <a16:creationId xmlns:a16="http://schemas.microsoft.com/office/drawing/2014/main" id="{BEE73659-1995-5B4C-9A82-1CBFFF73F711}"/>
+              </a:ext>
+            </a:extLst>
+          </p:cNvPr>
+          <p:cNvSpPr/>
+          <p:nvPr/>
+        </p:nvSpPr>
+        <p:spPr>
+          <a:xfrm>
+            <a:off x="13084285" y="17090339"/>
+            <a:ext cx="1880784" cy="459399"/>
+          </a:xfrm>
+          <a:prstGeom prst="rect">
+            <a:avLst/>
+          </a:prstGeom>
+          <a:solidFill>
+            <a:srgbClr val="0070C0"/>
+          </a:solidFill>
+          <a:ln w="19050">
+            <a:solidFill>
+              <a:srgbClr val="0070C0"/>
+            </a:solidFill>
+          </a:ln>
+          <a:effectLst/>
+        </p:spPr>
+        <p:style>
+          <a:lnRef idx="1">
+            <a:schemeClr val="accent2"/>
+          </a:lnRef>
+          <a:fillRef idx="2">
+            <a:schemeClr val="accent2"/>
+          </a:fillRef>
+          <a:effectRef idx="1">
+            <a:schemeClr val="accent2"/>
+          </a:effectRef>
+          <a:fontRef idx="minor">
+            <a:schemeClr val="dk1"/>
+          </a:fontRef>
+        </p:style>
+        <p:txBody>
+          <a:bodyPr rtlCol="0" anchor="ctr"/>
+          <a:lstStyle/>
+          <a:p>
+            <a:pPr algn="ctr"/>
+            <a:r>
+              <a:rPr lang="en-SG" sz="1600" dirty="0">
+                <a:solidFill>
+                  <a:schemeClr val="bg1"/>
+                </a:solidFill>
+              </a:rPr>
+              <a:t>:ArgumentMultimap</a:t>
+            </a:r>
+          </a:p>
+        </p:txBody>
+      </p:sp>
+      <p:sp>
+        <p:nvSpPr>
+          <p:cNvPr id="32" name="Rectangle 31">
+            <a:extLst>
+              <a:ext uri="{FF2B5EF4-FFF2-40B4-BE49-F238E27FC236}">
+                <a16:creationId xmlns:a16="http://schemas.microsoft.com/office/drawing/2014/main" id="{4EAD3568-339B-2248-8CF8-3B6B5B212F97}"/>
+              </a:ext>
+            </a:extLst>
+          </p:cNvPr>
+          <p:cNvSpPr/>
+          <p:nvPr/>
+        </p:nvSpPr>
+        <p:spPr>
+          <a:xfrm>
+            <a:off x="13912059" y="18250962"/>
+            <a:ext cx="154202" cy="273146"/>
+          </a:xfrm>
+          <a:prstGeom prst="rect">
+            <a:avLst/>
+          </a:prstGeom>
+          <a:solidFill>
+            <a:srgbClr val="0070C0"/>
+          </a:solidFill>
+          <a:ln>
+            <a:solidFill>
+              <a:srgbClr val="0070C0"/>
+            </a:solidFill>
+          </a:ln>
+          <a:effectLst/>
+        </p:spPr>
+        <p:style>
+          <a:lnRef idx="1">
+            <a:schemeClr val="accent3"/>
+          </a:lnRef>
+          <a:fillRef idx="2">
+            <a:schemeClr val="accent3"/>
+          </a:fillRef>
+          <a:effectRef idx="1">
+            <a:schemeClr val="accent3"/>
+          </a:effectRef>
+          <a:fontRef idx="minor">
+            <a:schemeClr val="dk1"/>
+          </a:fontRef>
+        </p:style>
+        <p:txBody>
+          <a:bodyPr rtlCol="0" anchor="ctr"/>
+          <a:lstStyle/>
+          <a:p>
+            <a:pPr algn="ctr"/>
+            <a:endParaRPr lang="en-SG" sz="1400"/>
+          </a:p>
+        </p:txBody>
+      </p:sp>
+      <p:sp>
+        <p:nvSpPr>
+          <p:cNvPr id="33" name="Rectangle 32">
+            <a:extLst>
+              <a:ext uri="{FF2B5EF4-FFF2-40B4-BE49-F238E27FC236}">
+                <a16:creationId xmlns:a16="http://schemas.microsoft.com/office/drawing/2014/main" id="{8FCC1B21-3922-F64D-AB58-95F0EE2D7D9A}"/>
+              </a:ext>
+            </a:extLst>
+          </p:cNvPr>
+          <p:cNvSpPr/>
+          <p:nvPr/>
+        </p:nvSpPr>
+        <p:spPr>
+          <a:xfrm>
+            <a:off x="13912059" y="18847809"/>
+            <a:ext cx="154202" cy="273146"/>
+          </a:xfrm>
+          <a:prstGeom prst="rect">
+            <a:avLst/>
+          </a:prstGeom>
+          <a:solidFill>
+            <a:srgbClr val="0070C0"/>
+          </a:solidFill>
+          <a:ln>
+            <a:solidFill>
+              <a:srgbClr val="0070C0"/>
+            </a:solidFill>
+          </a:ln>
+          <a:effectLst/>
+        </p:spPr>
+        <p:style>
+          <a:lnRef idx="1">
+            <a:schemeClr val="accent3"/>
+          </a:lnRef>
+          <a:fillRef idx="2">
+            <a:schemeClr val="accent3"/>
+          </a:fillRef>
+          <a:effectRef idx="1">
+            <a:schemeClr val="accent3"/>
+          </a:effectRef>
+          <a:fontRef idx="minor">
+            <a:schemeClr val="dk1"/>
+          </a:fontRef>
+        </p:style>
+        <p:txBody>
+          <a:bodyPr rtlCol="0" anchor="ctr"/>
+          <a:lstStyle/>
+          <a:p>
+            <a:pPr algn="ctr"/>
+            <a:endParaRPr lang="en-SG" sz="1400"/>
+          </a:p>
+        </p:txBody>
+      </p:sp>
+      <p:sp>
+        <p:nvSpPr>
+          <p:cNvPr id="35" name="TextBox 34">
+            <a:extLst>
+              <a:ext uri="{FF2B5EF4-FFF2-40B4-BE49-F238E27FC236}">
+                <a16:creationId xmlns:a16="http://schemas.microsoft.com/office/drawing/2014/main" id="{E23E2554-F116-0444-ACD2-CD039F790EA3}"/>
+              </a:ext>
+            </a:extLst>
+          </p:cNvPr>
+          <p:cNvSpPr txBox="1"/>
+          <p:nvPr/>
+        </p:nvSpPr>
+        <p:spPr>
+          <a:xfrm>
+            <a:off x="10399435" y="16996178"/>
+            <a:ext cx="2280771" cy="646331"/>
+          </a:xfrm>
+          <a:prstGeom prst="rect">
+            <a:avLst/>
+          </a:prstGeom>
+          <a:noFill/>
+        </p:spPr>
+        <p:txBody>
+          <a:bodyPr wrap="square" lIns="0" tIns="0" rIns="0" bIns="0" rtlCol="0">
+            <a:spAutoFit/>
+          </a:bodyPr>
+          <a:lstStyle>
+            <a:defPPr>
+              <a:defRPr lang="en-US"/>
+            </a:defPPr>
+            <a:lvl1pPr algn="r">
+              <a:defRPr sz="1400">
+                <a:solidFill>
+                  <a:srgbClr val="0070C0"/>
+                </a:solidFill>
+              </a:defRPr>
+            </a:lvl1pPr>
+          </a:lstStyle>
+          <a:p>
+            <a:r>
+              <a:rPr lang="en-US" sz="1050" dirty="0"/>
+              <a:t>tokenize(“</a:t>
+            </a:r>
+            <a:r>
+              <a:rPr lang="en-GB" sz="1050" dirty="0"/>
+              <a:t>n/Pending CC pm/01-05-2019 p/99887766 a/8 Pending Rd, Singapore 678295 s/XDH1429387 t/north-west </a:t>
+            </a:r>
+            <a:r>
+              <a:rPr lang="en-US" sz="1050" dirty="0"/>
+              <a:t>”</a:t>
+            </a:r>
+          </a:p>
+          <a:p>
+            <a:r>
+              <a:rPr lang="en-US" sz="1050" dirty="0"/>
+              <a:t>,”n/”,”p/”,”pm/”,”a/”,”s/”,”t/”)</a:t>
+            </a:r>
+          </a:p>
+        </p:txBody>
+      </p:sp>
+      <p:cxnSp>
+        <p:nvCxnSpPr>
+          <p:cNvPr id="36" name="Straight Arrow Connector 35">
+            <a:extLst>
+              <a:ext uri="{FF2B5EF4-FFF2-40B4-BE49-F238E27FC236}">
+                <a16:creationId xmlns:a16="http://schemas.microsoft.com/office/drawing/2014/main" id="{E918429C-E33B-904B-9D11-E186FDEC0739}"/>
+              </a:ext>
+            </a:extLst>
+          </p:cNvPr>
+          <p:cNvCxnSpPr>
+            <a:cxnSpLocks/>
+          </p:cNvCxnSpPr>
+          <p:nvPr/>
+        </p:nvCxnSpPr>
+        <p:spPr>
+          <a:xfrm>
+            <a:off x="10397481" y="18272750"/>
+            <a:ext cx="3522123" cy="0"/>
+          </a:xfrm>
+          <a:prstGeom prst="straightConnector1">
+            <a:avLst/>
+          </a:prstGeom>
+          <a:ln w="19050">
+            <a:solidFill>
+              <a:srgbClr val="0070C0"/>
+            </a:solidFill>
+            <a:tailEnd type="arrow"/>
+          </a:ln>
+        </p:spPr>
+        <p:style>
+          <a:lnRef idx="1">
+            <a:schemeClr val="accent1"/>
+          </a:lnRef>
+          <a:fillRef idx="0">
+            <a:schemeClr val="accent1"/>
+          </a:fillRef>
+          <a:effectRef idx="0">
+            <a:schemeClr val="accent1"/>
+          </a:effectRef>
+          <a:fontRef idx="minor">
+            <a:schemeClr val="tx1"/>
+          </a:fontRef>
+        </p:style>
+      </p:cxnSp>
+      <p:cxnSp>
+        <p:nvCxnSpPr>
+          <p:cNvPr id="37" name="Straight Arrow Connector 36">
+            <a:extLst>
+              <a:ext uri="{FF2B5EF4-FFF2-40B4-BE49-F238E27FC236}">
+                <a16:creationId xmlns:a16="http://schemas.microsoft.com/office/drawing/2014/main" id="{90F28E63-CEDD-1F45-AD21-3B86783B8396}"/>
+              </a:ext>
+            </a:extLst>
+          </p:cNvPr>
+          <p:cNvCxnSpPr>
+            <a:cxnSpLocks/>
+          </p:cNvCxnSpPr>
+          <p:nvPr/>
+        </p:nvCxnSpPr>
+        <p:spPr>
+          <a:xfrm>
+            <a:off x="10397481" y="18545896"/>
+            <a:ext cx="3514578" cy="0"/>
+          </a:xfrm>
+          <a:prstGeom prst="straightConnector1">
+            <a:avLst/>
+          </a:prstGeom>
+          <a:ln w="19050">
+            <a:solidFill>
+              <a:srgbClr val="0070C0"/>
+            </a:solidFill>
+            <a:prstDash val="sysDash"/>
+            <a:headEnd type="arrow" w="med" len="med"/>
+            <a:tailEnd type="none" w="med" len="med"/>
+          </a:ln>
+        </p:spPr>
+        <p:style>
+          <a:lnRef idx="1">
+            <a:schemeClr val="accent1"/>
+          </a:lnRef>
+          <a:fillRef idx="0">
+            <a:schemeClr val="accent1"/>
+          </a:fillRef>
+          <a:effectRef idx="0">
+            <a:schemeClr val="accent1"/>
+          </a:effectRef>
+          <a:fontRef idx="minor">
+            <a:schemeClr val="tx1"/>
+          </a:fontRef>
+        </p:style>
+      </p:cxnSp>
+      <p:sp>
+        <p:nvSpPr>
+          <p:cNvPr id="38" name="TextBox 37">
+            <a:extLst>
+              <a:ext uri="{FF2B5EF4-FFF2-40B4-BE49-F238E27FC236}">
+                <a16:creationId xmlns:a16="http://schemas.microsoft.com/office/drawing/2014/main" id="{8AD8A9AD-4D57-664D-9ECD-0DD41A77E1B2}"/>
+              </a:ext>
+            </a:extLst>
+          </p:cNvPr>
+          <p:cNvSpPr txBox="1"/>
+          <p:nvPr/>
+        </p:nvSpPr>
+        <p:spPr>
+          <a:xfrm>
+            <a:off x="10037490" y="18040422"/>
+            <a:ext cx="2359015" cy="215444"/>
+          </a:xfrm>
+          <a:prstGeom prst="rect">
+            <a:avLst/>
+          </a:prstGeom>
+          <a:noFill/>
+        </p:spPr>
+        <p:txBody>
+          <a:bodyPr wrap="square" lIns="0" tIns="0" rIns="0" bIns="0" rtlCol="0">
+            <a:spAutoFit/>
+          </a:bodyPr>
+          <a:lstStyle>
+            <a:defPPr>
+              <a:defRPr lang="en-US"/>
+            </a:defPPr>
+            <a:lvl1pPr algn="r">
+              <a:defRPr sz="1400">
+                <a:solidFill>
+                  <a:srgbClr val="0070C0"/>
+                </a:solidFill>
+              </a:defRPr>
+            </a:lvl1pPr>
+          </a:lstStyle>
+          <a:p>
+            <a:r>
+              <a:rPr lang="en-US" dirty="0"/>
+              <a:t>getAllValues(“n/”)</a:t>
+            </a:r>
+          </a:p>
+        </p:txBody>
+      </p:sp>
+      <p:cxnSp>
+        <p:nvCxnSpPr>
+          <p:cNvPr id="39" name="Straight Arrow Connector 38">
+            <a:extLst>
+              <a:ext uri="{FF2B5EF4-FFF2-40B4-BE49-F238E27FC236}">
+                <a16:creationId xmlns:a16="http://schemas.microsoft.com/office/drawing/2014/main" id="{787FEA3D-7126-6841-B590-76EBED9F381D}"/>
+              </a:ext>
+            </a:extLst>
+          </p:cNvPr>
+          <p:cNvCxnSpPr>
+            <a:cxnSpLocks/>
+          </p:cNvCxnSpPr>
+          <p:nvPr/>
+        </p:nvCxnSpPr>
+        <p:spPr>
+          <a:xfrm flipV="1">
+            <a:off x="10352274" y="18869598"/>
+            <a:ext cx="3559785" cy="32405"/>
+          </a:xfrm>
+          <a:prstGeom prst="straightConnector1">
+            <a:avLst/>
+          </a:prstGeom>
+          <a:ln w="19050">
+            <a:solidFill>
+              <a:srgbClr val="0070C0"/>
+            </a:solidFill>
+            <a:tailEnd type="arrow"/>
+          </a:ln>
+        </p:spPr>
+        <p:style>
+          <a:lnRef idx="1">
+            <a:schemeClr val="accent1"/>
+          </a:lnRef>
+          <a:fillRef idx="0">
+            <a:schemeClr val="accent1"/>
+          </a:fillRef>
+          <a:effectRef idx="0">
+            <a:schemeClr val="accent1"/>
+          </a:effectRef>
+          <a:fontRef idx="minor">
+            <a:schemeClr val="tx1"/>
+          </a:fontRef>
+        </p:style>
+      </p:cxnSp>
+      <p:sp>
+        <p:nvSpPr>
+          <p:cNvPr id="40" name="TextBox 39">
+            <a:extLst>
+              <a:ext uri="{FF2B5EF4-FFF2-40B4-BE49-F238E27FC236}">
+                <a16:creationId xmlns:a16="http://schemas.microsoft.com/office/drawing/2014/main" id="{2B62FF77-D061-7C4E-86D3-3D677F2D923E}"/>
+              </a:ext>
+            </a:extLst>
+          </p:cNvPr>
+          <p:cNvSpPr txBox="1"/>
+          <p:nvPr/>
+        </p:nvSpPr>
+        <p:spPr>
+          <a:xfrm>
+            <a:off x="10037489" y="18672486"/>
+            <a:ext cx="2359015" cy="215444"/>
+          </a:xfrm>
+          <a:prstGeom prst="rect">
+            <a:avLst/>
+          </a:prstGeom>
+          <a:noFill/>
+        </p:spPr>
+        <p:txBody>
+          <a:bodyPr wrap="square" lIns="0" tIns="0" rIns="0" bIns="0" rtlCol="0">
+            <a:spAutoFit/>
+          </a:bodyPr>
+          <a:lstStyle>
+            <a:defPPr>
+              <a:defRPr lang="en-US"/>
+            </a:defPPr>
+            <a:lvl1pPr algn="r">
+              <a:defRPr sz="1400">
+                <a:solidFill>
+                  <a:srgbClr val="0070C0"/>
+                </a:solidFill>
+              </a:defRPr>
+            </a:lvl1pPr>
+          </a:lstStyle>
+          <a:p>
+            <a:r>
+              <a:rPr lang="en-US" dirty="0"/>
+              <a:t>getAllValues(“p/”)</a:t>
+            </a:r>
+          </a:p>
+        </p:txBody>
+      </p:sp>
+      <p:cxnSp>
+        <p:nvCxnSpPr>
+          <p:cNvPr id="41" name="Straight Arrow Connector 40">
+            <a:extLst>
+              <a:ext uri="{FF2B5EF4-FFF2-40B4-BE49-F238E27FC236}">
+                <a16:creationId xmlns:a16="http://schemas.microsoft.com/office/drawing/2014/main" id="{12E86CBF-305B-984E-9C13-46AB2EEE5C15}"/>
+              </a:ext>
+            </a:extLst>
+          </p:cNvPr>
+          <p:cNvCxnSpPr>
+            <a:cxnSpLocks/>
+          </p:cNvCxnSpPr>
+          <p:nvPr/>
+        </p:nvCxnSpPr>
+        <p:spPr>
+          <a:xfrm>
+            <a:off x="10397481" y="19156555"/>
+            <a:ext cx="3523022" cy="0"/>
+          </a:xfrm>
+          <a:prstGeom prst="straightConnector1">
+            <a:avLst/>
+          </a:prstGeom>
+          <a:ln w="19050">
+            <a:solidFill>
+              <a:srgbClr val="0070C0"/>
+            </a:solidFill>
+            <a:prstDash val="sysDash"/>
+            <a:headEnd type="arrow" w="med" len="med"/>
+            <a:tailEnd type="none" w="med" len="med"/>
+          </a:ln>
+        </p:spPr>
+        <p:style>
+          <a:lnRef idx="1">
+            <a:schemeClr val="accent1"/>
+          </a:lnRef>
+          <a:fillRef idx="0">
+            <a:schemeClr val="accent1"/>
+          </a:fillRef>
+          <a:effectRef idx="0">
+            <a:schemeClr val="accent1"/>
+          </a:effectRef>
+          <a:fontRef idx="minor">
+            <a:schemeClr val="tx1"/>
+          </a:fontRef>
+        </p:style>
+      </p:cxnSp>
+      <p:sp>
+        <p:nvSpPr>
+          <p:cNvPr id="47" name="Rectangle 46">
+            <a:extLst>
+              <a:ext uri="{FF2B5EF4-FFF2-40B4-BE49-F238E27FC236}">
+                <a16:creationId xmlns:a16="http://schemas.microsoft.com/office/drawing/2014/main" id="{433F480C-23ED-F64D-9703-C71FD469AB2F}"/>
+              </a:ext>
+            </a:extLst>
+          </p:cNvPr>
+          <p:cNvSpPr/>
+          <p:nvPr/>
+        </p:nvSpPr>
+        <p:spPr>
+          <a:xfrm>
+            <a:off x="13912059" y="19406502"/>
+            <a:ext cx="154202" cy="273146"/>
+          </a:xfrm>
+          <a:prstGeom prst="rect">
+            <a:avLst/>
+          </a:prstGeom>
+          <a:solidFill>
+            <a:srgbClr val="0070C0"/>
+          </a:solidFill>
+          <a:ln>
+            <a:solidFill>
+              <a:srgbClr val="0070C0"/>
+            </a:solidFill>
+          </a:ln>
+          <a:effectLst/>
+        </p:spPr>
+        <p:style>
+          <a:lnRef idx="1">
+            <a:schemeClr val="accent3"/>
+          </a:lnRef>
+          <a:fillRef idx="2">
+            <a:schemeClr val="accent3"/>
+          </a:fillRef>
+          <a:effectRef idx="1">
+            <a:schemeClr val="accent3"/>
+          </a:effectRef>
+          <a:fontRef idx="minor">
+            <a:schemeClr val="dk1"/>
+          </a:fontRef>
+        </p:style>
+        <p:txBody>
+          <a:bodyPr rtlCol="0" anchor="ctr"/>
+          <a:lstStyle/>
+          <a:p>
+            <a:pPr algn="ctr"/>
+            <a:endParaRPr lang="en-SG" sz="1400"/>
+          </a:p>
+        </p:txBody>
+      </p:sp>
+      <p:cxnSp>
+        <p:nvCxnSpPr>
+          <p:cNvPr id="48" name="Straight Arrow Connector 47">
+            <a:extLst>
+              <a:ext uri="{FF2B5EF4-FFF2-40B4-BE49-F238E27FC236}">
+                <a16:creationId xmlns:a16="http://schemas.microsoft.com/office/drawing/2014/main" id="{93F94890-F0AD-DC48-A79E-F03E0C136985}"/>
+              </a:ext>
+            </a:extLst>
+          </p:cNvPr>
+          <p:cNvCxnSpPr>
+            <a:cxnSpLocks/>
+          </p:cNvCxnSpPr>
+          <p:nvPr/>
+        </p:nvCxnSpPr>
+        <p:spPr>
+          <a:xfrm flipV="1">
+            <a:off x="10352274" y="19428291"/>
+            <a:ext cx="3559785" cy="32405"/>
+          </a:xfrm>
+          <a:prstGeom prst="straightConnector1">
+            <a:avLst/>
+          </a:prstGeom>
+          <a:ln w="19050">
+            <a:solidFill>
+              <a:srgbClr val="0070C0"/>
+            </a:solidFill>
+            <a:tailEnd type="arrow"/>
+          </a:ln>
+        </p:spPr>
+        <p:style>
+          <a:lnRef idx="1">
+            <a:schemeClr val="accent1"/>
+          </a:lnRef>
+          <a:fillRef idx="0">
+            <a:schemeClr val="accent1"/>
+          </a:fillRef>
+          <a:effectRef idx="0">
+            <a:schemeClr val="accent1"/>
+          </a:effectRef>
+          <a:fontRef idx="minor">
+            <a:schemeClr val="tx1"/>
+          </a:fontRef>
+        </p:style>
+      </p:cxnSp>
+      <p:sp>
+        <p:nvSpPr>
+          <p:cNvPr id="49" name="TextBox 48">
+            <a:extLst>
+              <a:ext uri="{FF2B5EF4-FFF2-40B4-BE49-F238E27FC236}">
+                <a16:creationId xmlns:a16="http://schemas.microsoft.com/office/drawing/2014/main" id="{35121F11-1649-EE47-9644-9748BBD4FA67}"/>
+              </a:ext>
+            </a:extLst>
+          </p:cNvPr>
+          <p:cNvSpPr txBox="1"/>
+          <p:nvPr/>
+        </p:nvSpPr>
+        <p:spPr>
+          <a:xfrm>
+            <a:off x="10037489" y="19231179"/>
+            <a:ext cx="2359015" cy="215444"/>
+          </a:xfrm>
+          <a:prstGeom prst="rect">
+            <a:avLst/>
+          </a:prstGeom>
+          <a:noFill/>
+        </p:spPr>
+        <p:txBody>
+          <a:bodyPr wrap="square" lIns="0" tIns="0" rIns="0" bIns="0" rtlCol="0">
+            <a:spAutoFit/>
+          </a:bodyPr>
+          <a:lstStyle>
+            <a:defPPr>
+              <a:defRPr lang="en-US"/>
+            </a:defPPr>
+            <a:lvl1pPr algn="r">
+              <a:defRPr sz="1400">
+                <a:solidFill>
+                  <a:srgbClr val="0070C0"/>
+                </a:solidFill>
+              </a:defRPr>
+            </a:lvl1pPr>
+          </a:lstStyle>
+          <a:p>
+            <a:r>
+              <a:rPr lang="en-US" dirty="0"/>
+              <a:t>getAllValues(“pm/”)</a:t>
+            </a:r>
+          </a:p>
+        </p:txBody>
+      </p:sp>
+      <p:cxnSp>
+        <p:nvCxnSpPr>
+          <p:cNvPr id="50" name="Straight Arrow Connector 49">
+            <a:extLst>
+              <a:ext uri="{FF2B5EF4-FFF2-40B4-BE49-F238E27FC236}">
+                <a16:creationId xmlns:a16="http://schemas.microsoft.com/office/drawing/2014/main" id="{8E2CA40D-68CC-BA4E-8F9E-22CBAC6ABDAD}"/>
+              </a:ext>
+            </a:extLst>
+          </p:cNvPr>
+          <p:cNvCxnSpPr>
+            <a:cxnSpLocks/>
+            <a:endCxn id="47" idx="2"/>
+          </p:cNvCxnSpPr>
+          <p:nvPr/>
+        </p:nvCxnSpPr>
+        <p:spPr>
+          <a:xfrm flipV="1">
+            <a:off x="10397481" y="19679648"/>
+            <a:ext cx="3591679" cy="35600"/>
+          </a:xfrm>
+          <a:prstGeom prst="straightConnector1">
+            <a:avLst/>
+          </a:prstGeom>
+          <a:ln w="19050">
+            <a:solidFill>
+              <a:srgbClr val="0070C0"/>
+            </a:solidFill>
+            <a:prstDash val="sysDash"/>
+            <a:headEnd type="arrow" w="med" len="med"/>
+            <a:tailEnd type="none" w="med" len="med"/>
+          </a:ln>
+        </p:spPr>
+        <p:style>
+          <a:lnRef idx="1">
+            <a:schemeClr val="accent1"/>
+          </a:lnRef>
+          <a:fillRef idx="0">
+            <a:schemeClr val="accent1"/>
+          </a:fillRef>
+          <a:effectRef idx="0">
+            <a:schemeClr val="accent1"/>
+          </a:effectRef>
+          <a:fontRef idx="minor">
+            <a:schemeClr val="tx1"/>
+          </a:fontRef>
+        </p:style>
+      </p:cxnSp>
+      <p:sp>
+        <p:nvSpPr>
+          <p:cNvPr id="52" name="Rectangle 51">
+            <a:extLst>
+              <a:ext uri="{FF2B5EF4-FFF2-40B4-BE49-F238E27FC236}">
+                <a16:creationId xmlns:a16="http://schemas.microsoft.com/office/drawing/2014/main" id="{B4B751EF-CE5B-F54F-B03B-A68B359EDDAA}"/>
+              </a:ext>
+            </a:extLst>
+          </p:cNvPr>
+          <p:cNvSpPr/>
+          <p:nvPr/>
+        </p:nvSpPr>
+        <p:spPr>
+          <a:xfrm>
+            <a:off x="13943044" y="19973455"/>
+            <a:ext cx="154202" cy="273146"/>
+          </a:xfrm>
+          <a:prstGeom prst="rect">
+            <a:avLst/>
+          </a:prstGeom>
+          <a:solidFill>
+            <a:srgbClr val="0070C0"/>
+          </a:solidFill>
+          <a:ln>
+            <a:solidFill>
+              <a:srgbClr val="0070C0"/>
+            </a:solidFill>
+          </a:ln>
+          <a:effectLst/>
+        </p:spPr>
+        <p:style>
+          <a:lnRef idx="1">
+            <a:schemeClr val="accent3"/>
+          </a:lnRef>
+          <a:fillRef idx="2">
+            <a:schemeClr val="accent3"/>
+          </a:fillRef>
+          <a:effectRef idx="1">
+            <a:schemeClr val="accent3"/>
+          </a:effectRef>
+          <a:fontRef idx="minor">
+            <a:schemeClr val="dk1"/>
+          </a:fontRef>
+        </p:style>
+        <p:txBody>
+          <a:bodyPr rtlCol="0" anchor="ctr"/>
+          <a:lstStyle/>
+          <a:p>
+            <a:pPr algn="ctr"/>
+            <a:endParaRPr lang="en-SG" sz="1400"/>
+          </a:p>
+        </p:txBody>
+      </p:sp>
+      <p:cxnSp>
+        <p:nvCxnSpPr>
+          <p:cNvPr id="53" name="Straight Arrow Connector 52">
+            <a:extLst>
+              <a:ext uri="{FF2B5EF4-FFF2-40B4-BE49-F238E27FC236}">
+                <a16:creationId xmlns:a16="http://schemas.microsoft.com/office/drawing/2014/main" id="{6BD41F5D-CEA8-C24D-BA49-85D3D84D5FF4}"/>
+              </a:ext>
+            </a:extLst>
+          </p:cNvPr>
+          <p:cNvCxnSpPr>
+            <a:cxnSpLocks/>
+          </p:cNvCxnSpPr>
+          <p:nvPr/>
+        </p:nvCxnSpPr>
+        <p:spPr>
+          <a:xfrm flipV="1">
+            <a:off x="10383259" y="19995244"/>
+            <a:ext cx="3559785" cy="32405"/>
+          </a:xfrm>
+          <a:prstGeom prst="straightConnector1">
+            <a:avLst/>
+          </a:prstGeom>
+          <a:ln w="19050">
+            <a:solidFill>
+              <a:srgbClr val="0070C0"/>
+            </a:solidFill>
+            <a:tailEnd type="arrow"/>
+          </a:ln>
+        </p:spPr>
+        <p:style>
+          <a:lnRef idx="1">
+            <a:schemeClr val="accent1"/>
+          </a:lnRef>
+          <a:fillRef idx="0">
+            <a:schemeClr val="accent1"/>
+          </a:fillRef>
+          <a:effectRef idx="0">
+            <a:schemeClr val="accent1"/>
+          </a:effectRef>
+          <a:fontRef idx="minor">
+            <a:schemeClr val="tx1"/>
+          </a:fontRef>
+        </p:style>
+      </p:cxnSp>
+      <p:sp>
+        <p:nvSpPr>
+          <p:cNvPr id="54" name="TextBox 53">
+            <a:extLst>
+              <a:ext uri="{FF2B5EF4-FFF2-40B4-BE49-F238E27FC236}">
+                <a16:creationId xmlns:a16="http://schemas.microsoft.com/office/drawing/2014/main" id="{974F1CF2-7B98-4B4E-8C24-B927714E44DE}"/>
+              </a:ext>
+            </a:extLst>
+          </p:cNvPr>
+          <p:cNvSpPr txBox="1"/>
+          <p:nvPr/>
+        </p:nvSpPr>
+        <p:spPr>
+          <a:xfrm>
+            <a:off x="10068474" y="19798132"/>
+            <a:ext cx="2359015" cy="215444"/>
+          </a:xfrm>
+          <a:prstGeom prst="rect">
+            <a:avLst/>
+          </a:prstGeom>
+          <a:noFill/>
+        </p:spPr>
+        <p:txBody>
+          <a:bodyPr wrap="square" lIns="0" tIns="0" rIns="0" bIns="0" rtlCol="0">
+            <a:spAutoFit/>
+          </a:bodyPr>
+          <a:lstStyle>
+            <a:defPPr>
+              <a:defRPr lang="en-US"/>
+            </a:defPPr>
+            <a:lvl1pPr algn="r">
+              <a:defRPr sz="1400">
+                <a:solidFill>
+                  <a:srgbClr val="0070C0"/>
+                </a:solidFill>
+              </a:defRPr>
+            </a:lvl1pPr>
+          </a:lstStyle>
+          <a:p>
+            <a:r>
+              <a:rPr lang="en-US" dirty="0"/>
+              <a:t>getAllValues(“a/”)</a:t>
+            </a:r>
+          </a:p>
+        </p:txBody>
+      </p:sp>
+      <p:cxnSp>
+        <p:nvCxnSpPr>
+          <p:cNvPr id="55" name="Straight Arrow Connector 54">
+            <a:extLst>
+              <a:ext uri="{FF2B5EF4-FFF2-40B4-BE49-F238E27FC236}">
+                <a16:creationId xmlns:a16="http://schemas.microsoft.com/office/drawing/2014/main" id="{2C37BA1A-392A-DF45-B537-5B1FF9865FB6}"/>
+              </a:ext>
+            </a:extLst>
+          </p:cNvPr>
+          <p:cNvCxnSpPr>
+            <a:cxnSpLocks/>
+          </p:cNvCxnSpPr>
+          <p:nvPr/>
+        </p:nvCxnSpPr>
+        <p:spPr>
+          <a:xfrm>
+            <a:off x="10397481" y="20246601"/>
+            <a:ext cx="3523022" cy="0"/>
+          </a:xfrm>
+          <a:prstGeom prst="straightConnector1">
+            <a:avLst/>
+          </a:prstGeom>
+          <a:ln w="19050">
+            <a:solidFill>
+              <a:srgbClr val="0070C0"/>
+            </a:solidFill>
+            <a:prstDash val="sysDash"/>
+            <a:headEnd type="arrow" w="med" len="med"/>
+            <a:tailEnd type="none" w="med" len="med"/>
+          </a:ln>
+        </p:spPr>
+        <p:style>
+          <a:lnRef idx="1">
+            <a:schemeClr val="accent1"/>
+          </a:lnRef>
+          <a:fillRef idx="0">
+            <a:schemeClr val="accent1"/>
+          </a:fillRef>
+          <a:effectRef idx="0">
+            <a:schemeClr val="accent1"/>
+          </a:effectRef>
+          <a:fontRef idx="minor">
+            <a:schemeClr val="tx1"/>
+          </a:fontRef>
+        </p:style>
+      </p:cxnSp>
+      <p:sp>
+        <p:nvSpPr>
+          <p:cNvPr id="56" name="Rectangle 55">
+            <a:extLst>
+              <a:ext uri="{FF2B5EF4-FFF2-40B4-BE49-F238E27FC236}">
+                <a16:creationId xmlns:a16="http://schemas.microsoft.com/office/drawing/2014/main" id="{F99FED5F-5196-6547-93C3-A12826B6F37B}"/>
+              </a:ext>
+            </a:extLst>
+          </p:cNvPr>
+          <p:cNvSpPr/>
+          <p:nvPr/>
+        </p:nvSpPr>
+        <p:spPr>
+          <a:xfrm>
+            <a:off x="13943044" y="20508225"/>
+            <a:ext cx="154202" cy="273146"/>
+          </a:xfrm>
+          <a:prstGeom prst="rect">
+            <a:avLst/>
+          </a:prstGeom>
+          <a:solidFill>
+            <a:srgbClr val="0070C0"/>
+          </a:solidFill>
+          <a:ln>
+            <a:solidFill>
+              <a:srgbClr val="0070C0"/>
+            </a:solidFill>
+          </a:ln>
+          <a:effectLst/>
+        </p:spPr>
+        <p:style>
+          <a:lnRef idx="1">
+            <a:schemeClr val="accent3"/>
+          </a:lnRef>
+          <a:fillRef idx="2">
+            <a:schemeClr val="accent3"/>
+          </a:fillRef>
+          <a:effectRef idx="1">
+            <a:schemeClr val="accent3"/>
+          </a:effectRef>
+          <a:fontRef idx="minor">
+            <a:schemeClr val="dk1"/>
+          </a:fontRef>
+        </p:style>
+        <p:txBody>
+          <a:bodyPr rtlCol="0" anchor="ctr"/>
+          <a:lstStyle/>
+          <a:p>
+            <a:pPr algn="ctr"/>
+            <a:endParaRPr lang="en-SG" sz="1400"/>
+          </a:p>
+        </p:txBody>
+      </p:sp>
+      <p:cxnSp>
+        <p:nvCxnSpPr>
+          <p:cNvPr id="57" name="Straight Arrow Connector 56">
+            <a:extLst>
+              <a:ext uri="{FF2B5EF4-FFF2-40B4-BE49-F238E27FC236}">
+                <a16:creationId xmlns:a16="http://schemas.microsoft.com/office/drawing/2014/main" id="{34294D67-1A89-924E-BCE7-604E32D8EA62}"/>
+              </a:ext>
+            </a:extLst>
+          </p:cNvPr>
+          <p:cNvCxnSpPr>
+            <a:cxnSpLocks/>
+          </p:cNvCxnSpPr>
+          <p:nvPr/>
+        </p:nvCxnSpPr>
+        <p:spPr>
+          <a:xfrm flipV="1">
+            <a:off x="10383259" y="20530014"/>
+            <a:ext cx="3559785" cy="32405"/>
+          </a:xfrm>
+          <a:prstGeom prst="straightConnector1">
+            <a:avLst/>
+          </a:prstGeom>
+          <a:ln w="19050">
+            <a:solidFill>
+              <a:srgbClr val="0070C0"/>
+            </a:solidFill>
+            <a:tailEnd type="arrow"/>
+          </a:ln>
+        </p:spPr>
+        <p:style>
+          <a:lnRef idx="1">
+            <a:schemeClr val="accent1"/>
+          </a:lnRef>
+          <a:fillRef idx="0">
+            <a:schemeClr val="accent1"/>
+          </a:fillRef>
+          <a:effectRef idx="0">
+            <a:schemeClr val="accent1"/>
+          </a:effectRef>
+          <a:fontRef idx="minor">
+            <a:schemeClr val="tx1"/>
+          </a:fontRef>
+        </p:style>
+      </p:cxnSp>
+      <p:sp>
+        <p:nvSpPr>
+          <p:cNvPr id="58" name="TextBox 57">
+            <a:extLst>
+              <a:ext uri="{FF2B5EF4-FFF2-40B4-BE49-F238E27FC236}">
+                <a16:creationId xmlns:a16="http://schemas.microsoft.com/office/drawing/2014/main" id="{0C1B5047-69B5-2744-B44B-3490B3CBD649}"/>
+              </a:ext>
+            </a:extLst>
+          </p:cNvPr>
+          <p:cNvSpPr txBox="1"/>
+          <p:nvPr/>
+        </p:nvSpPr>
+        <p:spPr>
+          <a:xfrm>
+            <a:off x="10068474" y="20332902"/>
+            <a:ext cx="2359015" cy="215444"/>
+          </a:xfrm>
+          <a:prstGeom prst="rect">
+            <a:avLst/>
+          </a:prstGeom>
+          <a:noFill/>
+        </p:spPr>
+        <p:txBody>
+          <a:bodyPr wrap="square" lIns="0" tIns="0" rIns="0" bIns="0" rtlCol="0">
+            <a:spAutoFit/>
+          </a:bodyPr>
+          <a:lstStyle>
+            <a:defPPr>
+              <a:defRPr lang="en-US"/>
+            </a:defPPr>
+            <a:lvl1pPr algn="r">
+              <a:defRPr sz="1400">
+                <a:solidFill>
+                  <a:srgbClr val="0070C0"/>
+                </a:solidFill>
+              </a:defRPr>
+            </a:lvl1pPr>
+          </a:lstStyle>
+          <a:p>
+            <a:r>
+              <a:rPr lang="en-US" dirty="0"/>
+              <a:t>getAllValues(“s/”)</a:t>
+            </a:r>
+          </a:p>
+        </p:txBody>
+      </p:sp>
+      <p:cxnSp>
+        <p:nvCxnSpPr>
+          <p:cNvPr id="59" name="Straight Arrow Connector 58">
+            <a:extLst>
+              <a:ext uri="{FF2B5EF4-FFF2-40B4-BE49-F238E27FC236}">
+                <a16:creationId xmlns:a16="http://schemas.microsoft.com/office/drawing/2014/main" id="{C0FC7AB2-0F39-8F4D-AB2D-B35F192D70BF}"/>
+              </a:ext>
+            </a:extLst>
+          </p:cNvPr>
+          <p:cNvCxnSpPr>
+            <a:cxnSpLocks/>
+          </p:cNvCxnSpPr>
+          <p:nvPr/>
+        </p:nvCxnSpPr>
+        <p:spPr>
+          <a:xfrm>
+            <a:off x="10428466" y="20816971"/>
+            <a:ext cx="3523022" cy="0"/>
+          </a:xfrm>
+          <a:prstGeom prst="straightConnector1">
+            <a:avLst/>
+          </a:prstGeom>
+          <a:ln w="19050">
+            <a:solidFill>
+              <a:srgbClr val="0070C0"/>
+            </a:solidFill>
+            <a:prstDash val="sysDash"/>
+            <a:headEnd type="arrow" w="med" len="med"/>
+            <a:tailEnd type="none" w="med" len="med"/>
+          </a:ln>
+        </p:spPr>
+        <p:style>
+          <a:lnRef idx="1">
+            <a:schemeClr val="accent1"/>
+          </a:lnRef>
+          <a:fillRef idx="0">
+            <a:schemeClr val="accent1"/>
+          </a:fillRef>
+          <a:effectRef idx="0">
+            <a:schemeClr val="accent1"/>
+          </a:effectRef>
+          <a:fontRef idx="minor">
+            <a:schemeClr val="tx1"/>
+          </a:fontRef>
+        </p:style>
+      </p:cxnSp>
+      <p:sp>
+        <p:nvSpPr>
+          <p:cNvPr id="60" name="Rectangle 59">
+            <a:extLst>
+              <a:ext uri="{FF2B5EF4-FFF2-40B4-BE49-F238E27FC236}">
+                <a16:creationId xmlns:a16="http://schemas.microsoft.com/office/drawing/2014/main" id="{FEBB4864-4F33-F841-84B4-5F3680D706A2}"/>
+              </a:ext>
+            </a:extLst>
+          </p:cNvPr>
+          <p:cNvSpPr/>
+          <p:nvPr/>
+        </p:nvSpPr>
+        <p:spPr>
+          <a:xfrm>
+            <a:off x="13959713" y="21088874"/>
+            <a:ext cx="154202" cy="273146"/>
+          </a:xfrm>
+          <a:prstGeom prst="rect">
+            <a:avLst/>
+          </a:prstGeom>
+          <a:solidFill>
+            <a:srgbClr val="0070C0"/>
+          </a:solidFill>
+          <a:ln>
+            <a:solidFill>
+              <a:srgbClr val="0070C0"/>
+            </a:solidFill>
+          </a:ln>
+          <a:effectLst/>
+        </p:spPr>
+        <p:style>
+          <a:lnRef idx="1">
+            <a:schemeClr val="accent3"/>
+          </a:lnRef>
+          <a:fillRef idx="2">
+            <a:schemeClr val="accent3"/>
+          </a:fillRef>
+          <a:effectRef idx="1">
+            <a:schemeClr val="accent3"/>
+          </a:effectRef>
+          <a:fontRef idx="minor">
+            <a:schemeClr val="dk1"/>
+          </a:fontRef>
+        </p:style>
+        <p:txBody>
+          <a:bodyPr rtlCol="0" anchor="ctr"/>
+          <a:lstStyle/>
+          <a:p>
+            <a:pPr algn="ctr"/>
+            <a:endParaRPr lang="en-SG" sz="1400"/>
+          </a:p>
+        </p:txBody>
+      </p:sp>
+      <p:cxnSp>
+        <p:nvCxnSpPr>
+          <p:cNvPr id="61" name="Straight Arrow Connector 60">
+            <a:extLst>
+              <a:ext uri="{FF2B5EF4-FFF2-40B4-BE49-F238E27FC236}">
+                <a16:creationId xmlns:a16="http://schemas.microsoft.com/office/drawing/2014/main" id="{CB0CA339-E52E-3C45-AAC7-0082DBDB7CA9}"/>
+              </a:ext>
+            </a:extLst>
+          </p:cNvPr>
+          <p:cNvCxnSpPr>
+            <a:cxnSpLocks/>
+          </p:cNvCxnSpPr>
+          <p:nvPr/>
+        </p:nvCxnSpPr>
+        <p:spPr>
+          <a:xfrm flipV="1">
+            <a:off x="10399928" y="21110663"/>
+            <a:ext cx="3559785" cy="32405"/>
+          </a:xfrm>
+          <a:prstGeom prst="straightConnector1">
+            <a:avLst/>
+          </a:prstGeom>
+          <a:ln w="19050">
+            <a:solidFill>
+              <a:srgbClr val="0070C0"/>
+            </a:solidFill>
+            <a:tailEnd type="arrow"/>
+          </a:ln>
+        </p:spPr>
+        <p:style>
+          <a:lnRef idx="1">
+            <a:schemeClr val="accent1"/>
+          </a:lnRef>
+          <a:fillRef idx="0">
+            <a:schemeClr val="accent1"/>
+          </a:fillRef>
+          <a:effectRef idx="0">
+            <a:schemeClr val="accent1"/>
+          </a:effectRef>
+          <a:fontRef idx="minor">
+            <a:schemeClr val="tx1"/>
+          </a:fontRef>
+        </p:style>
+      </p:cxnSp>
+      <p:sp>
+        <p:nvSpPr>
+          <p:cNvPr id="62" name="TextBox 61">
+            <a:extLst>
+              <a:ext uri="{FF2B5EF4-FFF2-40B4-BE49-F238E27FC236}">
+                <a16:creationId xmlns:a16="http://schemas.microsoft.com/office/drawing/2014/main" id="{51ACEAD8-E5D7-894B-8714-32BCA678E0EA}"/>
+              </a:ext>
+            </a:extLst>
+          </p:cNvPr>
+          <p:cNvSpPr txBox="1"/>
+          <p:nvPr/>
+        </p:nvSpPr>
+        <p:spPr>
+          <a:xfrm>
+            <a:off x="10501072" y="20913551"/>
+            <a:ext cx="1943086" cy="215444"/>
+          </a:xfrm>
+          <a:prstGeom prst="rect">
+            <a:avLst/>
+          </a:prstGeom>
+          <a:noFill/>
+        </p:spPr>
+        <p:txBody>
+          <a:bodyPr wrap="square" lIns="0" tIns="0" rIns="0" bIns="0" rtlCol="0">
+            <a:spAutoFit/>
+          </a:bodyPr>
+          <a:lstStyle>
+            <a:defPPr>
+              <a:defRPr lang="en-US"/>
+            </a:defPPr>
+            <a:lvl1pPr algn="r">
+              <a:defRPr sz="1400">
+                <a:solidFill>
+                  <a:srgbClr val="0070C0"/>
+                </a:solidFill>
+              </a:defRPr>
+            </a:lvl1pPr>
+          </a:lstStyle>
+          <a:p>
+            <a:r>
+              <a:rPr lang="en-US" dirty="0"/>
+              <a:t>getAllValues(“t/”)</a:t>
+            </a:r>
+          </a:p>
+        </p:txBody>
+      </p:sp>
+      <p:cxnSp>
+        <p:nvCxnSpPr>
+          <p:cNvPr id="63" name="Straight Arrow Connector 62">
+            <a:extLst>
+              <a:ext uri="{FF2B5EF4-FFF2-40B4-BE49-F238E27FC236}">
+                <a16:creationId xmlns:a16="http://schemas.microsoft.com/office/drawing/2014/main" id="{272F1E2B-0BBC-7346-9D33-6290660770B8}"/>
+              </a:ext>
+            </a:extLst>
+          </p:cNvPr>
+          <p:cNvCxnSpPr>
+            <a:cxnSpLocks/>
+          </p:cNvCxnSpPr>
+          <p:nvPr/>
+        </p:nvCxnSpPr>
+        <p:spPr>
+          <a:xfrm>
+            <a:off x="10379869" y="21397620"/>
+            <a:ext cx="3523022" cy="0"/>
+          </a:xfrm>
+          <a:prstGeom prst="straightConnector1">
+            <a:avLst/>
+          </a:prstGeom>
+          <a:ln w="19050">
+            <a:solidFill>
+              <a:srgbClr val="0070C0"/>
+            </a:solidFill>
+            <a:prstDash val="sysDash"/>
+            <a:headEnd type="arrow" w="med" len="med"/>
+            <a:tailEnd type="none" w="med" len="med"/>
+          </a:ln>
+        </p:spPr>
+        <p:style>
+          <a:lnRef idx="1">
+            <a:schemeClr val="accent1"/>
+          </a:lnRef>
+          <a:fillRef idx="0">
+            <a:schemeClr val="accent1"/>
+          </a:fillRef>
+          <a:effectRef idx="0">
+            <a:schemeClr val="accent1"/>
+          </a:effectRef>
+          <a:fontRef idx="minor">
+            <a:schemeClr val="tx1"/>
+          </a:fontRef>
+        </p:style>
+      </p:cxnSp>
+      <p:sp>
+        <p:nvSpPr>
+          <p:cNvPr id="70" name="Rectangle 62">
+            <a:extLst>
+              <a:ext uri="{FF2B5EF4-FFF2-40B4-BE49-F238E27FC236}">
+                <a16:creationId xmlns:a16="http://schemas.microsoft.com/office/drawing/2014/main" id="{25E6256D-D4B1-B748-9CA1-B50A9DE1B4AA}"/>
+              </a:ext>
+            </a:extLst>
+          </p:cNvPr>
+          <p:cNvSpPr/>
+          <p:nvPr/>
+        </p:nvSpPr>
+        <p:spPr>
+          <a:xfrm>
+            <a:off x="15874599" y="22098914"/>
+            <a:ext cx="1726990" cy="459399"/>
+          </a:xfrm>
+          <a:prstGeom prst="rect">
+            <a:avLst/>
+          </a:prstGeom>
+          <a:solidFill>
+            <a:srgbClr val="0070C0"/>
+          </a:solidFill>
+          <a:ln w="19050">
+            <a:solidFill>
+              <a:srgbClr val="0070C0"/>
+            </a:solidFill>
+          </a:ln>
+          <a:effectLst/>
+        </p:spPr>
+        <p:style>
+          <a:lnRef idx="1">
+            <a:schemeClr val="accent2"/>
+          </a:lnRef>
+          <a:fillRef idx="2">
+            <a:schemeClr val="accent2"/>
+          </a:fillRef>
+          <a:effectRef idx="1">
+            <a:schemeClr val="accent2"/>
+          </a:effectRef>
+          <a:fontRef idx="minor">
+            <a:schemeClr val="dk1"/>
+          </a:fontRef>
+        </p:style>
+        <p:txBody>
+          <a:bodyPr rtlCol="0" anchor="ctr"/>
+          <a:lstStyle/>
+          <a:p>
+            <a:pPr algn="ctr"/>
+            <a:r>
+              <a:rPr lang="en-US" sz="1600" dirty="0">
+                <a:solidFill>
+                  <a:schemeClr val="bg1"/>
+                </a:solidFill>
+              </a:rPr>
+              <a:t>:AddCommand</a:t>
+            </a:r>
+            <a:endParaRPr lang="en-SG" sz="1600" dirty="0">
+              <a:solidFill>
+                <a:schemeClr val="bg1"/>
+              </a:solidFill>
+            </a:endParaRPr>
+          </a:p>
+        </p:txBody>
+      </p:sp>
+      <p:sp>
+        <p:nvSpPr>
+          <p:cNvPr id="71" name="Rectangle 70">
+            <a:extLst>
+              <a:ext uri="{FF2B5EF4-FFF2-40B4-BE49-F238E27FC236}">
+                <a16:creationId xmlns:a16="http://schemas.microsoft.com/office/drawing/2014/main" id="{49506109-5039-0449-8C43-9D8A3A7B3C81}"/>
+              </a:ext>
+            </a:extLst>
+          </p:cNvPr>
+          <p:cNvSpPr/>
+          <p:nvPr/>
+        </p:nvSpPr>
+        <p:spPr>
+          <a:xfrm>
+            <a:off x="16690135" y="22557214"/>
+            <a:ext cx="167203" cy="355838"/>
+          </a:xfrm>
+          <a:prstGeom prst="rect">
+            <a:avLst/>
+          </a:prstGeom>
+          <a:solidFill>
+            <a:srgbClr val="0070C0"/>
+          </a:solidFill>
+          <a:ln>
+            <a:solidFill>
+              <a:srgbClr val="0070C0"/>
+            </a:solidFill>
+          </a:ln>
+          <a:effectLst/>
+        </p:spPr>
+        <p:style>
+          <a:lnRef idx="1">
+            <a:schemeClr val="accent3"/>
+          </a:lnRef>
+          <a:fillRef idx="2">
+            <a:schemeClr val="accent3"/>
+          </a:fillRef>
+          <a:effectRef idx="1">
+            <a:schemeClr val="accent3"/>
+          </a:effectRef>
+          <a:fontRef idx="minor">
+            <a:schemeClr val="dk1"/>
+          </a:fontRef>
+        </p:style>
+        <p:txBody>
+          <a:bodyPr rtlCol="0" anchor="ctr"/>
+          <a:lstStyle/>
+          <a:p>
+            <a:pPr algn="ctr"/>
+            <a:endParaRPr lang="en-SG" sz="1400"/>
+          </a:p>
+        </p:txBody>
+      </p:sp>
+      <p:cxnSp>
+        <p:nvCxnSpPr>
+          <p:cNvPr id="72" name="Straight Arrow Connector 71">
+            <a:extLst>
+              <a:ext uri="{FF2B5EF4-FFF2-40B4-BE49-F238E27FC236}">
+                <a16:creationId xmlns:a16="http://schemas.microsoft.com/office/drawing/2014/main" id="{8B1C4C90-4B62-974C-B5A2-DED9AD7F4C61}"/>
+              </a:ext>
+            </a:extLst>
+          </p:cNvPr>
+          <p:cNvCxnSpPr>
+            <a:cxnSpLocks/>
+          </p:cNvCxnSpPr>
+          <p:nvPr/>
+        </p:nvCxnSpPr>
+        <p:spPr>
+          <a:xfrm flipV="1">
+            <a:off x="10399435" y="22902027"/>
+            <a:ext cx="6366813" cy="3220"/>
+          </a:xfrm>
+          <a:prstGeom prst="straightConnector1">
+            <a:avLst/>
+          </a:prstGeom>
+          <a:ln w="19050">
+            <a:solidFill>
+              <a:srgbClr val="0070C0"/>
+            </a:solidFill>
+            <a:prstDash val="sysDash"/>
+            <a:headEnd type="arrow" w="med" len="med"/>
+            <a:tailEnd type="none" w="med" len="med"/>
+          </a:ln>
+        </p:spPr>
+        <p:style>
+          <a:lnRef idx="1">
+            <a:schemeClr val="accent1"/>
+          </a:lnRef>
+          <a:fillRef idx="0">
+            <a:schemeClr val="accent1"/>
+          </a:fillRef>
+          <a:effectRef idx="0">
+            <a:schemeClr val="accent1"/>
+          </a:effectRef>
+          <a:fontRef idx="minor">
+            <a:schemeClr val="tx1"/>
+          </a:fontRef>
+        </p:style>
+      </p:cxnSp>
+      <p:cxnSp>
+        <p:nvCxnSpPr>
+          <p:cNvPr id="73" name="Straight Arrow Connector 72">
+            <a:extLst>
+              <a:ext uri="{FF2B5EF4-FFF2-40B4-BE49-F238E27FC236}">
+                <a16:creationId xmlns:a16="http://schemas.microsoft.com/office/drawing/2014/main" id="{99D1F5CE-9BBC-E745-9F12-E53369E96C3E}"/>
+              </a:ext>
+            </a:extLst>
+          </p:cNvPr>
+          <p:cNvCxnSpPr>
+            <a:cxnSpLocks/>
+            <a:endCxn id="70" idx="1"/>
+          </p:cNvCxnSpPr>
+          <p:nvPr/>
+        </p:nvCxnSpPr>
+        <p:spPr>
+          <a:xfrm>
+            <a:off x="10399650" y="22328226"/>
+            <a:ext cx="5474951" cy="386"/>
+          </a:xfrm>
+          <a:prstGeom prst="straightConnector1">
+            <a:avLst/>
+          </a:prstGeom>
+          <a:ln w="19050">
+            <a:solidFill>
+              <a:srgbClr val="0070C0"/>
+            </a:solidFill>
+            <a:tailEnd type="arrow"/>
+          </a:ln>
+        </p:spPr>
+        <p:style>
+          <a:lnRef idx="1">
+            <a:schemeClr val="accent1"/>
+          </a:lnRef>
+          <a:fillRef idx="0">
+            <a:schemeClr val="accent1"/>
+          </a:fillRef>
+          <a:effectRef idx="0">
+            <a:schemeClr val="accent1"/>
+          </a:effectRef>
+          <a:fontRef idx="minor">
+            <a:schemeClr val="tx1"/>
+          </a:fontRef>
+        </p:style>
+      </p:cxnSp>
+      <p:sp>
+        <p:nvSpPr>
+          <p:cNvPr id="74" name="TextBox 73">
+            <a:extLst>
+              <a:ext uri="{FF2B5EF4-FFF2-40B4-BE49-F238E27FC236}">
+                <a16:creationId xmlns:a16="http://schemas.microsoft.com/office/drawing/2014/main" id="{FAB8E945-99EF-0E41-B822-5F7138BB587C}"/>
+              </a:ext>
+            </a:extLst>
+          </p:cNvPr>
+          <p:cNvSpPr txBox="1"/>
+          <p:nvPr/>
+        </p:nvSpPr>
+        <p:spPr>
+          <a:xfrm>
+            <a:off x="10705995" y="22965875"/>
+            <a:ext cx="855809" cy="215444"/>
+          </a:xfrm>
+          <a:prstGeom prst="rect">
+            <a:avLst/>
+          </a:prstGeom>
+          <a:noFill/>
+        </p:spPr>
+        <p:txBody>
+          <a:bodyPr wrap="square" lIns="0" tIns="0" rIns="0" bIns="0" rtlCol="0">
+            <a:spAutoFit/>
+          </a:bodyPr>
+          <a:lstStyle>
+            <a:defPPr>
+              <a:defRPr lang="en-US"/>
+            </a:defPPr>
+            <a:lvl1pPr algn="r">
+              <a:defRPr sz="1400">
+                <a:solidFill>
+                  <a:srgbClr val="0070C0"/>
+                </a:solidFill>
+              </a:defRPr>
+            </a:lvl1pPr>
+          </a:lstStyle>
+          <a:p>
+            <a:r>
+              <a:rPr lang="en-US" dirty="0"/>
+              <a:t>execute()</a:t>
+            </a:r>
+          </a:p>
+        </p:txBody>
+      </p:sp>
+      <p:sp>
+        <p:nvSpPr>
+          <p:cNvPr id="75" name="TextBox 74">
+            <a:extLst>
+              <a:ext uri="{FF2B5EF4-FFF2-40B4-BE49-F238E27FC236}">
+                <a16:creationId xmlns:a16="http://schemas.microsoft.com/office/drawing/2014/main" id="{FAEDF5FE-0848-1D4B-8E39-4B261ECDD37D}"/>
+              </a:ext>
+            </a:extLst>
+          </p:cNvPr>
+          <p:cNvSpPr txBox="1"/>
+          <p:nvPr/>
+        </p:nvSpPr>
+        <p:spPr>
+          <a:xfrm>
+            <a:off x="10915413" y="24716352"/>
+            <a:ext cx="621216" cy="215444"/>
+          </a:xfrm>
+          <a:prstGeom prst="rect">
+            <a:avLst/>
+          </a:prstGeom>
+          <a:noFill/>
+        </p:spPr>
+        <p:txBody>
+          <a:bodyPr wrap="square" lIns="0" tIns="0" rIns="0" bIns="0" rtlCol="0">
+            <a:spAutoFit/>
+          </a:bodyPr>
+          <a:lstStyle>
+            <a:defPPr>
+              <a:defRPr lang="en-US"/>
+            </a:defPPr>
+            <a:lvl1pPr algn="r">
+              <a:defRPr sz="1400">
+                <a:solidFill>
+                  <a:srgbClr val="0070C0"/>
+                </a:solidFill>
+              </a:defRPr>
+            </a:lvl1pPr>
+          </a:lstStyle>
+          <a:p>
+            <a:r>
+              <a:rPr lang="en-US" dirty="0"/>
+              <a:t>result</a:t>
+            </a:r>
+          </a:p>
+        </p:txBody>
+      </p:sp>
+      <p:cxnSp>
+        <p:nvCxnSpPr>
+          <p:cNvPr id="76" name="Straight Arrow Connector 75">
+            <a:extLst>
+              <a:ext uri="{FF2B5EF4-FFF2-40B4-BE49-F238E27FC236}">
+                <a16:creationId xmlns:a16="http://schemas.microsoft.com/office/drawing/2014/main" id="{3519CF47-20AC-614D-8848-72B69A448EF7}"/>
+              </a:ext>
+            </a:extLst>
+          </p:cNvPr>
+          <p:cNvCxnSpPr>
+            <a:cxnSpLocks/>
+          </p:cNvCxnSpPr>
+          <p:nvPr/>
+        </p:nvCxnSpPr>
+        <p:spPr>
+          <a:xfrm>
+            <a:off x="5937049" y="23255065"/>
+            <a:ext cx="10786713" cy="0"/>
+          </a:xfrm>
+          <a:prstGeom prst="straightConnector1">
+            <a:avLst/>
+          </a:prstGeom>
+          <a:ln w="19050">
+            <a:solidFill>
+              <a:srgbClr val="0070C0"/>
+            </a:solidFill>
+            <a:tailEnd type="arrow"/>
+          </a:ln>
+        </p:spPr>
+        <p:style>
+          <a:lnRef idx="1">
+            <a:schemeClr val="accent1"/>
+          </a:lnRef>
+          <a:fillRef idx="0">
+            <a:schemeClr val="accent1"/>
+          </a:fillRef>
+          <a:effectRef idx="0">
+            <a:schemeClr val="accent1"/>
+          </a:effectRef>
+          <a:fontRef idx="minor">
+            <a:schemeClr val="tx1"/>
+          </a:fontRef>
+        </p:style>
+      </p:cxnSp>
+      <p:sp>
+        <p:nvSpPr>
+          <p:cNvPr id="77" name="Rectangle 76">
+            <a:extLst>
+              <a:ext uri="{FF2B5EF4-FFF2-40B4-BE49-F238E27FC236}">
+                <a16:creationId xmlns:a16="http://schemas.microsoft.com/office/drawing/2014/main" id="{FCCB06D7-6AED-0546-87D1-275BF823BF60}"/>
+              </a:ext>
+            </a:extLst>
+          </p:cNvPr>
+          <p:cNvSpPr/>
+          <p:nvPr/>
+        </p:nvSpPr>
+        <p:spPr>
+          <a:xfrm>
+            <a:off x="16687162" y="23247260"/>
+            <a:ext cx="183938" cy="1740468"/>
+          </a:xfrm>
+          <a:prstGeom prst="rect">
+            <a:avLst/>
+          </a:prstGeom>
+          <a:solidFill>
+            <a:srgbClr val="0070C0"/>
+          </a:solidFill>
+          <a:ln>
+            <a:solidFill>
+              <a:srgbClr val="0070C0"/>
+            </a:solidFill>
+          </a:ln>
+          <a:effectLst/>
+        </p:spPr>
+        <p:style>
+          <a:lnRef idx="1">
+            <a:schemeClr val="accent3"/>
+          </a:lnRef>
+          <a:fillRef idx="2">
+            <a:schemeClr val="accent3"/>
+          </a:fillRef>
+          <a:effectRef idx="1">
+            <a:schemeClr val="accent3"/>
+          </a:effectRef>
+          <a:fontRef idx="minor">
+            <a:schemeClr val="dk1"/>
+          </a:fontRef>
+        </p:style>
+        <p:txBody>
+          <a:bodyPr rtlCol="0" anchor="ctr"/>
+          <a:lstStyle/>
+          <a:p>
+            <a:pPr algn="ctr"/>
+            <a:endParaRPr lang="en-SG" sz="1400"/>
+          </a:p>
+        </p:txBody>
+      </p:sp>
+      <p:cxnSp>
+        <p:nvCxnSpPr>
+          <p:cNvPr id="78" name="Straight Arrow Connector 77">
+            <a:extLst>
+              <a:ext uri="{FF2B5EF4-FFF2-40B4-BE49-F238E27FC236}">
+                <a16:creationId xmlns:a16="http://schemas.microsoft.com/office/drawing/2014/main" id="{BA1EC6D4-2D01-CC43-851D-422FDD464172}"/>
+              </a:ext>
+            </a:extLst>
+          </p:cNvPr>
+          <p:cNvCxnSpPr>
+            <a:cxnSpLocks/>
+          </p:cNvCxnSpPr>
+          <p:nvPr/>
+        </p:nvCxnSpPr>
+        <p:spPr>
+          <a:xfrm flipV="1">
+            <a:off x="5858382" y="24996317"/>
+            <a:ext cx="10821997" cy="1610"/>
+          </a:xfrm>
+          <a:prstGeom prst="straightConnector1">
+            <a:avLst/>
+          </a:prstGeom>
+          <a:ln w="19050">
+            <a:solidFill>
+              <a:srgbClr val="0070C0"/>
+            </a:solidFill>
+            <a:prstDash val="sysDash"/>
+            <a:headEnd type="arrow" w="med" len="med"/>
+            <a:tailEnd type="none" w="med" len="med"/>
+          </a:ln>
+        </p:spPr>
+        <p:style>
+          <a:lnRef idx="1">
+            <a:schemeClr val="accent1"/>
+          </a:lnRef>
+          <a:fillRef idx="0">
+            <a:schemeClr val="accent1"/>
+          </a:fillRef>
+          <a:effectRef idx="0">
+            <a:schemeClr val="accent1"/>
+          </a:effectRef>
+          <a:fontRef idx="minor">
+            <a:schemeClr val="tx1"/>
+          </a:fontRef>
+        </p:style>
+      </p:cxnSp>
+      <p:cxnSp>
+        <p:nvCxnSpPr>
+          <p:cNvPr id="80" name="Straight Connector 79">
+            <a:extLst>
+              <a:ext uri="{FF2B5EF4-FFF2-40B4-BE49-F238E27FC236}">
+                <a16:creationId xmlns:a16="http://schemas.microsoft.com/office/drawing/2014/main" id="{AD6899DA-63A9-7F4D-8E49-2FAF101AA88C}"/>
+              </a:ext>
+            </a:extLst>
+          </p:cNvPr>
+          <p:cNvCxnSpPr>
+            <a:cxnSpLocks/>
+          </p:cNvCxnSpPr>
+          <p:nvPr/>
+        </p:nvCxnSpPr>
+        <p:spPr>
+          <a:xfrm>
+            <a:off x="16765538" y="22680227"/>
+            <a:ext cx="29680" cy="3701642"/>
+          </a:xfrm>
+          <a:prstGeom prst="line">
+            <a:avLst/>
+          </a:prstGeom>
+          <a:ln w="19050">
+            <a:solidFill>
+              <a:srgbClr val="0070C0"/>
+            </a:solidFill>
+            <a:prstDash val="sysDash"/>
+          </a:ln>
+          <a:effectLst/>
+        </p:spPr>
+        <p:style>
+          <a:lnRef idx="1">
+            <a:schemeClr val="accent1"/>
+          </a:lnRef>
+          <a:fillRef idx="2">
+            <a:schemeClr val="accent1"/>
+          </a:fillRef>
+          <a:effectRef idx="1">
+            <a:schemeClr val="accent1"/>
+          </a:effectRef>
+          <a:fontRef idx="minor">
+            <a:schemeClr val="dk1"/>
+          </a:fontRef>
+        </p:style>
+      </p:cxnSp>
+      <p:sp>
+        <p:nvSpPr>
+          <p:cNvPr id="81" name="TextBox 80">
+            <a:extLst>
+              <a:ext uri="{FF2B5EF4-FFF2-40B4-BE49-F238E27FC236}">
+                <a16:creationId xmlns:a16="http://schemas.microsoft.com/office/drawing/2014/main" id="{BA383CDB-9342-BC49-8A25-16CE4B099560}"/>
+              </a:ext>
+            </a:extLst>
+          </p:cNvPr>
+          <p:cNvSpPr txBox="1"/>
+          <p:nvPr/>
+        </p:nvSpPr>
+        <p:spPr>
+          <a:xfrm>
+            <a:off x="10193132" y="22982630"/>
+            <a:ext cx="258404" cy="261610"/>
+          </a:xfrm>
+          <a:prstGeom prst="rect">
+            <a:avLst/>
+          </a:prstGeom>
+          <a:noFill/>
+        </p:spPr>
+        <p:txBody>
+          <a:bodyPr wrap="none" rtlCol="0">
+            <a:spAutoFit/>
+          </a:bodyPr>
+          <a:lstStyle/>
+          <a:p>
+            <a:r>
+              <a:rPr lang="en-SG" sz="1100" dirty="0">
+                <a:solidFill>
+                  <a:srgbClr val="002060"/>
+                </a:solidFill>
+              </a:rPr>
+              <a:t>X</a:t>
+            </a:r>
+          </a:p>
+        </p:txBody>
+      </p:sp>
+      <p:sp>
+        <p:nvSpPr>
+          <p:cNvPr id="85" name="Rectangle 62">
+            <a:extLst>
+              <a:ext uri="{FF2B5EF4-FFF2-40B4-BE49-F238E27FC236}">
+                <a16:creationId xmlns:a16="http://schemas.microsoft.com/office/drawing/2014/main" id="{B67BEA32-E9BF-F242-9A7D-DE7CF42E314D}"/>
+              </a:ext>
+            </a:extLst>
+          </p:cNvPr>
+          <p:cNvSpPr/>
+          <p:nvPr/>
+        </p:nvSpPr>
+        <p:spPr>
+          <a:xfrm>
+            <a:off x="19281862" y="22614382"/>
+            <a:ext cx="925800" cy="300180"/>
+          </a:xfrm>
+          <a:prstGeom prst="rect">
+            <a:avLst/>
+          </a:prstGeom>
+          <a:solidFill>
+            <a:srgbClr val="7030A0"/>
+          </a:solidFill>
+          <a:ln w="19050">
+            <a:solidFill>
+              <a:srgbClr val="7030A0"/>
+            </a:solidFill>
+          </a:ln>
+          <a:effectLst/>
+        </p:spPr>
+        <p:style>
+          <a:lnRef idx="1">
+            <a:schemeClr val="accent2"/>
+          </a:lnRef>
+          <a:fillRef idx="2">
+            <a:schemeClr val="accent2"/>
+          </a:fillRef>
+          <a:effectRef idx="1">
+            <a:schemeClr val="accent2"/>
+          </a:effectRef>
+          <a:fontRef idx="minor">
+            <a:schemeClr val="dk1"/>
+          </a:fontRef>
+        </p:style>
+        <p:txBody>
+          <a:bodyPr rtlCol="0" anchor="ctr"/>
+          <a:lstStyle/>
+          <a:p>
+            <a:pPr algn="ctr"/>
+            <a:r>
+              <a:rPr lang="en-US" sz="1600" dirty="0">
+                <a:solidFill>
+                  <a:schemeClr val="bg1"/>
+                </a:solidFill>
+              </a:rPr>
+              <a:t>: Model</a:t>
+            </a:r>
+            <a:endParaRPr lang="en-SG" sz="1600" dirty="0">
+              <a:solidFill>
+                <a:schemeClr val="bg1"/>
+              </a:solidFill>
+            </a:endParaRPr>
+          </a:p>
+        </p:txBody>
+      </p:sp>
+      <p:cxnSp>
+        <p:nvCxnSpPr>
+          <p:cNvPr id="86" name="Straight Connector 85">
+            <a:extLst>
+              <a:ext uri="{FF2B5EF4-FFF2-40B4-BE49-F238E27FC236}">
+                <a16:creationId xmlns:a16="http://schemas.microsoft.com/office/drawing/2014/main" id="{3FB422BC-FBA1-624F-A17B-F04D968F8254}"/>
+              </a:ext>
+            </a:extLst>
+          </p:cNvPr>
+          <p:cNvCxnSpPr>
+            <a:cxnSpLocks/>
+          </p:cNvCxnSpPr>
+          <p:nvPr/>
+        </p:nvCxnSpPr>
+        <p:spPr>
+          <a:xfrm flipH="1">
+            <a:off x="19742784" y="22914562"/>
+            <a:ext cx="287" cy="3543507"/>
+          </a:xfrm>
+          <a:prstGeom prst="line">
+            <a:avLst/>
+          </a:prstGeom>
+          <a:ln w="19050">
+            <a:solidFill>
+              <a:srgbClr val="7030A0"/>
+            </a:solidFill>
+            <a:prstDash val="sysDash"/>
+          </a:ln>
+          <a:effectLst/>
+        </p:spPr>
+        <p:style>
+          <a:lnRef idx="1">
+            <a:schemeClr val="accent1"/>
+          </a:lnRef>
+          <a:fillRef idx="2">
+            <a:schemeClr val="accent1"/>
+          </a:fillRef>
+          <a:effectRef idx="1">
+            <a:schemeClr val="accent1"/>
+          </a:effectRef>
+          <a:fontRef idx="minor">
+            <a:schemeClr val="dk1"/>
+          </a:fontRef>
+        </p:style>
+      </p:cxnSp>
+      <p:sp>
+        <p:nvSpPr>
+          <p:cNvPr id="87" name="Rectangle 86">
+            <a:extLst>
+              <a:ext uri="{FF2B5EF4-FFF2-40B4-BE49-F238E27FC236}">
+                <a16:creationId xmlns:a16="http://schemas.microsoft.com/office/drawing/2014/main" id="{FF9E96C5-C06F-8E43-A476-9FF7E8D70BBB}"/>
+              </a:ext>
+            </a:extLst>
+          </p:cNvPr>
+          <p:cNvSpPr/>
+          <p:nvPr/>
+        </p:nvSpPr>
+        <p:spPr>
+          <a:xfrm>
+            <a:off x="19658905" y="23425950"/>
+            <a:ext cx="195185" cy="300180"/>
+          </a:xfrm>
+          <a:prstGeom prst="rect">
+            <a:avLst/>
+          </a:prstGeom>
+          <a:solidFill>
+            <a:srgbClr val="7030A0"/>
+          </a:solidFill>
+          <a:ln>
+            <a:solidFill>
+              <a:srgbClr val="7030A0"/>
+            </a:solidFill>
+          </a:ln>
+          <a:effectLst/>
+        </p:spPr>
+        <p:style>
+          <a:lnRef idx="1">
+            <a:schemeClr val="accent3"/>
+          </a:lnRef>
+          <a:fillRef idx="2">
+            <a:schemeClr val="accent3"/>
+          </a:fillRef>
+          <a:effectRef idx="1">
+            <a:schemeClr val="accent3"/>
+          </a:effectRef>
+          <a:fontRef idx="minor">
+            <a:schemeClr val="dk1"/>
+          </a:fontRef>
+        </p:style>
+        <p:txBody>
+          <a:bodyPr rtlCol="0" anchor="ctr"/>
+          <a:lstStyle/>
+          <a:p>
+            <a:pPr algn="ctr"/>
+            <a:endParaRPr lang="en-SG" sz="1400"/>
+          </a:p>
+        </p:txBody>
+      </p:sp>
+      <p:cxnSp>
+        <p:nvCxnSpPr>
+          <p:cNvPr id="88" name="Straight Arrow Connector 87">
+            <a:extLst>
+              <a:ext uri="{FF2B5EF4-FFF2-40B4-BE49-F238E27FC236}">
+                <a16:creationId xmlns:a16="http://schemas.microsoft.com/office/drawing/2014/main" id="{9324E841-508C-184D-BB9B-84F018540359}"/>
+              </a:ext>
+            </a:extLst>
+          </p:cNvPr>
+          <p:cNvCxnSpPr>
+            <a:cxnSpLocks/>
+          </p:cNvCxnSpPr>
+          <p:nvPr/>
+        </p:nvCxnSpPr>
+        <p:spPr>
+          <a:xfrm>
+            <a:off x="16795218" y="23435499"/>
+            <a:ext cx="2872799" cy="0"/>
+          </a:xfrm>
+          <a:prstGeom prst="straightConnector1">
+            <a:avLst/>
+          </a:prstGeom>
+          <a:ln w="19050">
+            <a:solidFill>
+              <a:srgbClr val="0070C0"/>
+            </a:solidFill>
+            <a:tailEnd type="arrow"/>
+          </a:ln>
+        </p:spPr>
+        <p:style>
+          <a:lnRef idx="1">
+            <a:schemeClr val="accent1"/>
+          </a:lnRef>
+          <a:fillRef idx="0">
+            <a:schemeClr val="accent1"/>
+          </a:fillRef>
+          <a:effectRef idx="0">
+            <a:schemeClr val="accent1"/>
+          </a:effectRef>
+          <a:fontRef idx="minor">
+            <a:schemeClr val="tx1"/>
+          </a:fontRef>
+        </p:style>
+      </p:cxnSp>
+      <p:cxnSp>
+        <p:nvCxnSpPr>
+          <p:cNvPr id="89" name="Straight Arrow Connector 88">
+            <a:extLst>
+              <a:ext uri="{FF2B5EF4-FFF2-40B4-BE49-F238E27FC236}">
+                <a16:creationId xmlns:a16="http://schemas.microsoft.com/office/drawing/2014/main" id="{056A6977-9DFC-A841-A5E1-A877EECBAF27}"/>
+              </a:ext>
+            </a:extLst>
+          </p:cNvPr>
+          <p:cNvCxnSpPr>
+            <a:cxnSpLocks/>
+          </p:cNvCxnSpPr>
+          <p:nvPr/>
+        </p:nvCxnSpPr>
+        <p:spPr>
+          <a:xfrm>
+            <a:off x="16826065" y="23726130"/>
+            <a:ext cx="2846071" cy="0"/>
+          </a:xfrm>
+          <a:prstGeom prst="straightConnector1">
+            <a:avLst/>
+          </a:prstGeom>
+          <a:ln w="19050">
+            <a:solidFill>
+              <a:srgbClr val="7030A0"/>
+            </a:solidFill>
+            <a:prstDash val="sysDash"/>
+            <a:headEnd type="arrow" w="med" len="med"/>
+            <a:tailEnd type="none" w="med" len="med"/>
+          </a:ln>
+        </p:spPr>
+        <p:style>
+          <a:lnRef idx="1">
+            <a:schemeClr val="accent1"/>
+          </a:lnRef>
+          <a:fillRef idx="0">
+            <a:schemeClr val="accent1"/>
+          </a:fillRef>
+          <a:effectRef idx="0">
+            <a:schemeClr val="accent1"/>
+          </a:effectRef>
+          <a:fontRef idx="minor">
+            <a:schemeClr val="tx1"/>
+          </a:fontRef>
+        </p:style>
+      </p:cxnSp>
+      <p:sp>
+        <p:nvSpPr>
+          <p:cNvPr id="90" name="TextBox 89">
+            <a:extLst>
+              <a:ext uri="{FF2B5EF4-FFF2-40B4-BE49-F238E27FC236}">
+                <a16:creationId xmlns:a16="http://schemas.microsoft.com/office/drawing/2014/main" id="{6F7BFEEC-AC66-3E4A-9EA3-1272387A76CA}"/>
+              </a:ext>
+            </a:extLst>
+          </p:cNvPr>
+          <p:cNvSpPr txBox="1"/>
+          <p:nvPr/>
+        </p:nvSpPr>
+        <p:spPr>
+          <a:xfrm>
+            <a:off x="16826065" y="23155908"/>
+            <a:ext cx="2804091" cy="215444"/>
+          </a:xfrm>
+          <a:prstGeom prst="rect">
+            <a:avLst/>
+          </a:prstGeom>
+          <a:noFill/>
+        </p:spPr>
+        <p:txBody>
+          <a:bodyPr wrap="square" lIns="0" tIns="0" rIns="0" bIns="0" rtlCol="0">
+            <a:spAutoFit/>
+          </a:bodyPr>
+          <a:lstStyle>
+            <a:defPPr>
+              <a:defRPr lang="en-US"/>
+            </a:defPPr>
+            <a:lvl1pPr algn="r">
+              <a:defRPr sz="1400">
+                <a:solidFill>
+                  <a:srgbClr val="0070C0"/>
+                </a:solidFill>
+              </a:defRPr>
+            </a:lvl1pPr>
+          </a:lstStyle>
+          <a:p>
+            <a:r>
+              <a:rPr lang="en-US" dirty="0">
+                <a:solidFill>
+                  <a:schemeClr val="accent4">
+                    <a:lumMod val="75000"/>
+                  </a:schemeClr>
+                </a:solidFill>
+              </a:rPr>
+              <a:t>addClient(Name)</a:t>
+            </a:r>
+            <a:endParaRPr lang="en-US" dirty="0"/>
+          </a:p>
+        </p:txBody>
+      </p:sp>
+      <p:sp>
+        <p:nvSpPr>
+          <p:cNvPr id="92" name="Rectangle 91">
+            <a:extLst>
+              <a:ext uri="{FF2B5EF4-FFF2-40B4-BE49-F238E27FC236}">
+                <a16:creationId xmlns:a16="http://schemas.microsoft.com/office/drawing/2014/main" id="{0F8B70C3-861B-C245-9C2E-91B2A6A23FE4}"/>
+              </a:ext>
+            </a:extLst>
+          </p:cNvPr>
+          <p:cNvSpPr/>
+          <p:nvPr/>
+        </p:nvSpPr>
+        <p:spPr>
+          <a:xfrm>
+            <a:off x="19687654" y="24023545"/>
+            <a:ext cx="195185" cy="300180"/>
+          </a:xfrm>
+          <a:prstGeom prst="rect">
+            <a:avLst/>
+          </a:prstGeom>
+          <a:solidFill>
+            <a:srgbClr val="7030A0"/>
+          </a:solidFill>
+          <a:ln>
+            <a:solidFill>
+              <a:srgbClr val="7030A0"/>
+            </a:solidFill>
+          </a:ln>
+          <a:effectLst/>
+        </p:spPr>
+        <p:style>
+          <a:lnRef idx="1">
+            <a:schemeClr val="accent3"/>
+          </a:lnRef>
+          <a:fillRef idx="2">
+            <a:schemeClr val="accent3"/>
+          </a:fillRef>
+          <a:effectRef idx="1">
+            <a:schemeClr val="accent3"/>
+          </a:effectRef>
+          <a:fontRef idx="minor">
+            <a:schemeClr val="dk1"/>
+          </a:fontRef>
+        </p:style>
+        <p:txBody>
+          <a:bodyPr rtlCol="0" anchor="ctr"/>
+          <a:lstStyle/>
+          <a:p>
+            <a:pPr algn="ctr"/>
+            <a:endParaRPr lang="en-SG" sz="1400"/>
+          </a:p>
+        </p:txBody>
+      </p:sp>
+      <p:cxnSp>
+        <p:nvCxnSpPr>
+          <p:cNvPr id="93" name="Straight Arrow Connector 92">
+            <a:extLst>
+              <a:ext uri="{FF2B5EF4-FFF2-40B4-BE49-F238E27FC236}">
+                <a16:creationId xmlns:a16="http://schemas.microsoft.com/office/drawing/2014/main" id="{54D1F617-589D-D647-8708-19D65D8F9CA0}"/>
+              </a:ext>
+            </a:extLst>
+          </p:cNvPr>
+          <p:cNvCxnSpPr>
+            <a:cxnSpLocks/>
+          </p:cNvCxnSpPr>
+          <p:nvPr/>
+        </p:nvCxnSpPr>
+        <p:spPr>
+          <a:xfrm>
+            <a:off x="16823967" y="24033094"/>
+            <a:ext cx="2872799" cy="0"/>
+          </a:xfrm>
+          <a:prstGeom prst="straightConnector1">
+            <a:avLst/>
+          </a:prstGeom>
+          <a:ln w="19050">
+            <a:solidFill>
+              <a:srgbClr val="0070C0"/>
+            </a:solidFill>
+            <a:tailEnd type="arrow"/>
+          </a:ln>
+        </p:spPr>
+        <p:style>
+          <a:lnRef idx="1">
+            <a:schemeClr val="accent1"/>
+          </a:lnRef>
+          <a:fillRef idx="0">
+            <a:schemeClr val="accent1"/>
+          </a:fillRef>
+          <a:effectRef idx="0">
+            <a:schemeClr val="accent1"/>
+          </a:effectRef>
+          <a:fontRef idx="minor">
+            <a:schemeClr val="tx1"/>
+          </a:fontRef>
+        </p:style>
+      </p:cxnSp>
+      <p:cxnSp>
+        <p:nvCxnSpPr>
+          <p:cNvPr id="94" name="Straight Arrow Connector 93">
+            <a:extLst>
+              <a:ext uri="{FF2B5EF4-FFF2-40B4-BE49-F238E27FC236}">
+                <a16:creationId xmlns:a16="http://schemas.microsoft.com/office/drawing/2014/main" id="{5BE2BA23-65AB-4A4A-8CBF-FEDEF53CF9B3}"/>
+              </a:ext>
+            </a:extLst>
+          </p:cNvPr>
+          <p:cNvCxnSpPr>
+            <a:cxnSpLocks/>
+          </p:cNvCxnSpPr>
+          <p:nvPr/>
+        </p:nvCxnSpPr>
+        <p:spPr>
+          <a:xfrm>
+            <a:off x="16854814" y="24323725"/>
+            <a:ext cx="2846071" cy="0"/>
+          </a:xfrm>
+          <a:prstGeom prst="straightConnector1">
+            <a:avLst/>
+          </a:prstGeom>
+          <a:ln w="19050">
+            <a:solidFill>
+              <a:srgbClr val="7030A0"/>
+            </a:solidFill>
+            <a:prstDash val="sysDash"/>
+            <a:headEnd type="arrow" w="med" len="med"/>
+            <a:tailEnd type="none" w="med" len="med"/>
+          </a:ln>
+        </p:spPr>
+        <p:style>
+          <a:lnRef idx="1">
+            <a:schemeClr val="accent1"/>
+          </a:lnRef>
+          <a:fillRef idx="0">
+            <a:schemeClr val="accent1"/>
+          </a:fillRef>
+          <a:effectRef idx="0">
+            <a:schemeClr val="accent1"/>
+          </a:effectRef>
+          <a:fontRef idx="minor">
+            <a:schemeClr val="tx1"/>
+          </a:fontRef>
+        </p:style>
+      </p:cxnSp>
+      <p:sp>
+        <p:nvSpPr>
+          <p:cNvPr id="95" name="TextBox 94">
+            <a:extLst>
+              <a:ext uri="{FF2B5EF4-FFF2-40B4-BE49-F238E27FC236}">
+                <a16:creationId xmlns:a16="http://schemas.microsoft.com/office/drawing/2014/main" id="{A1AE76D8-E325-3A4D-849E-C5482B64E905}"/>
+              </a:ext>
+            </a:extLst>
+          </p:cNvPr>
+          <p:cNvSpPr txBox="1"/>
+          <p:nvPr/>
+        </p:nvSpPr>
+        <p:spPr>
+          <a:xfrm>
+            <a:off x="16854814" y="23753503"/>
+            <a:ext cx="2804091" cy="215444"/>
+          </a:xfrm>
+          <a:prstGeom prst="rect">
+            <a:avLst/>
+          </a:prstGeom>
+          <a:noFill/>
+        </p:spPr>
+        <p:txBody>
+          <a:bodyPr wrap="square" lIns="0" tIns="0" rIns="0" bIns="0" rtlCol="0">
+            <a:spAutoFit/>
+          </a:bodyPr>
+          <a:lstStyle>
+            <a:defPPr>
+              <a:defRPr lang="en-US"/>
+            </a:defPPr>
+            <a:lvl1pPr algn="r">
+              <a:defRPr sz="1400">
+                <a:solidFill>
+                  <a:srgbClr val="0070C0"/>
+                </a:solidFill>
+              </a:defRPr>
+            </a:lvl1pPr>
+          </a:lstStyle>
+          <a:p>
+            <a:r>
+              <a:rPr lang="en-US" dirty="0">
+                <a:solidFill>
+                  <a:schemeClr val="accent4">
+                    <a:lumMod val="75000"/>
+                  </a:schemeClr>
+                </a:solidFill>
+              </a:rPr>
+              <a:t>addEquipment(Equipment)</a:t>
+            </a:r>
+            <a:endParaRPr lang="en-US" dirty="0"/>
+          </a:p>
+        </p:txBody>
+      </p:sp>
+      <p:cxnSp>
+        <p:nvCxnSpPr>
+          <p:cNvPr id="97" name="Straight Arrow Connector 96">
+            <a:extLst>
+              <a:ext uri="{FF2B5EF4-FFF2-40B4-BE49-F238E27FC236}">
+                <a16:creationId xmlns:a16="http://schemas.microsoft.com/office/drawing/2014/main" id="{8A74A259-203E-884E-AA6C-7163EE3EBFFE}"/>
+              </a:ext>
+            </a:extLst>
+          </p:cNvPr>
+          <p:cNvCxnSpPr>
+            <a:cxnSpLocks/>
+          </p:cNvCxnSpPr>
+          <p:nvPr/>
+        </p:nvCxnSpPr>
+        <p:spPr>
+          <a:xfrm>
+            <a:off x="5937049" y="22913052"/>
+            <a:ext cx="4251172" cy="0"/>
+          </a:xfrm>
+          <a:prstGeom prst="straightConnector1">
+            <a:avLst/>
+          </a:prstGeom>
+          <a:ln w="19050">
+            <a:solidFill>
+              <a:srgbClr val="0070C0"/>
+            </a:solidFill>
+            <a:prstDash val="sysDash"/>
+            <a:headEnd type="arrow" w="med" len="med"/>
+            <a:tailEnd type="none" w="med" len="med"/>
+          </a:ln>
+        </p:spPr>
+        <p:style>
+          <a:lnRef idx="1">
+            <a:schemeClr val="accent1"/>
+          </a:lnRef>
+          <a:fillRef idx="0">
+            <a:schemeClr val="accent1"/>
+          </a:fillRef>
+          <a:effectRef idx="0">
+            <a:schemeClr val="accent1"/>
+          </a:effectRef>
+          <a:fontRef idx="minor">
+            <a:schemeClr val="tx1"/>
+          </a:fontRef>
+        </p:style>
+      </p:cxnSp>
+      <p:sp>
+        <p:nvSpPr>
+          <p:cNvPr id="99" name="Rectangle 98">
+            <a:extLst>
+              <a:ext uri="{FF2B5EF4-FFF2-40B4-BE49-F238E27FC236}">
+                <a16:creationId xmlns:a16="http://schemas.microsoft.com/office/drawing/2014/main" id="{B65E1B49-CC4D-644E-B51D-76135C93D09E}"/>
+              </a:ext>
+            </a:extLst>
+          </p:cNvPr>
+          <p:cNvSpPr/>
+          <p:nvPr/>
+        </p:nvSpPr>
+        <p:spPr>
+          <a:xfrm>
+            <a:off x="19686602" y="24706803"/>
+            <a:ext cx="195185" cy="300180"/>
+          </a:xfrm>
+          <a:prstGeom prst="rect">
+            <a:avLst/>
+          </a:prstGeom>
+          <a:solidFill>
+            <a:srgbClr val="7030A0"/>
+          </a:solidFill>
+          <a:ln>
+            <a:solidFill>
+              <a:srgbClr val="7030A0"/>
+            </a:solidFill>
+          </a:ln>
+          <a:effectLst/>
+        </p:spPr>
+        <p:style>
+          <a:lnRef idx="1">
+            <a:schemeClr val="accent3"/>
+          </a:lnRef>
+          <a:fillRef idx="2">
+            <a:schemeClr val="accent3"/>
+          </a:fillRef>
+          <a:effectRef idx="1">
+            <a:schemeClr val="accent3"/>
+          </a:effectRef>
+          <a:fontRef idx="minor">
+            <a:schemeClr val="dk1"/>
+          </a:fontRef>
+        </p:style>
+        <p:txBody>
+          <a:bodyPr rtlCol="0" anchor="ctr"/>
+          <a:lstStyle/>
+          <a:p>
+            <a:pPr algn="ctr"/>
+            <a:endParaRPr lang="en-SG" sz="1400"/>
+          </a:p>
+        </p:txBody>
+      </p:sp>
+      <p:cxnSp>
+        <p:nvCxnSpPr>
+          <p:cNvPr id="100" name="Straight Arrow Connector 99">
+            <a:extLst>
+              <a:ext uri="{FF2B5EF4-FFF2-40B4-BE49-F238E27FC236}">
+                <a16:creationId xmlns:a16="http://schemas.microsoft.com/office/drawing/2014/main" id="{F58B1B4A-8678-394D-8FDD-BD5D7A1F8E32}"/>
+              </a:ext>
+            </a:extLst>
+          </p:cNvPr>
+          <p:cNvCxnSpPr>
+            <a:cxnSpLocks/>
+          </p:cNvCxnSpPr>
+          <p:nvPr/>
+        </p:nvCxnSpPr>
+        <p:spPr>
+          <a:xfrm>
+            <a:off x="16822915" y="24716352"/>
+            <a:ext cx="2872799" cy="0"/>
+          </a:xfrm>
+          <a:prstGeom prst="straightConnector1">
+            <a:avLst/>
+          </a:prstGeom>
+          <a:ln w="19050">
+            <a:solidFill>
+              <a:srgbClr val="0070C0"/>
+            </a:solidFill>
+            <a:tailEnd type="arrow"/>
+          </a:ln>
+        </p:spPr>
+        <p:style>
+          <a:lnRef idx="1">
+            <a:schemeClr val="accent1"/>
+          </a:lnRef>
+          <a:fillRef idx="0">
+            <a:schemeClr val="accent1"/>
+          </a:fillRef>
+          <a:effectRef idx="0">
+            <a:schemeClr val="accent1"/>
+          </a:effectRef>
+          <a:fontRef idx="minor">
+            <a:schemeClr val="tx1"/>
+          </a:fontRef>
+        </p:style>
+      </p:cxnSp>
+      <p:cxnSp>
+        <p:nvCxnSpPr>
+          <p:cNvPr id="101" name="Straight Arrow Connector 100">
+            <a:extLst>
+              <a:ext uri="{FF2B5EF4-FFF2-40B4-BE49-F238E27FC236}">
+                <a16:creationId xmlns:a16="http://schemas.microsoft.com/office/drawing/2014/main" id="{426B52E5-5B20-F847-ACE9-19A1A930E73C}"/>
+              </a:ext>
+            </a:extLst>
+          </p:cNvPr>
+          <p:cNvCxnSpPr>
+            <a:cxnSpLocks/>
+          </p:cNvCxnSpPr>
+          <p:nvPr/>
+        </p:nvCxnSpPr>
+        <p:spPr>
+          <a:xfrm>
+            <a:off x="16853762" y="25006983"/>
+            <a:ext cx="2846071" cy="0"/>
+          </a:xfrm>
+          <a:prstGeom prst="straightConnector1">
+            <a:avLst/>
+          </a:prstGeom>
+          <a:ln w="19050">
+            <a:solidFill>
+              <a:srgbClr val="7030A0"/>
+            </a:solidFill>
+            <a:prstDash val="sysDash"/>
+            <a:headEnd type="arrow" w="med" len="med"/>
+            <a:tailEnd type="none" w="med" len="med"/>
+          </a:ln>
+        </p:spPr>
+        <p:style>
+          <a:lnRef idx="1">
+            <a:schemeClr val="accent1"/>
+          </a:lnRef>
+          <a:fillRef idx="0">
+            <a:schemeClr val="accent1"/>
+          </a:fillRef>
+          <a:effectRef idx="0">
+            <a:schemeClr val="accent1"/>
+          </a:effectRef>
+          <a:fontRef idx="minor">
+            <a:schemeClr val="tx1"/>
+          </a:fontRef>
+        </p:style>
+      </p:cxnSp>
+      <p:sp>
+        <p:nvSpPr>
+          <p:cNvPr id="102" name="TextBox 101">
+            <a:extLst>
+              <a:ext uri="{FF2B5EF4-FFF2-40B4-BE49-F238E27FC236}">
+                <a16:creationId xmlns:a16="http://schemas.microsoft.com/office/drawing/2014/main" id="{2A303C16-880E-5D49-9C3F-F7143DFD3B67}"/>
+              </a:ext>
+            </a:extLst>
+          </p:cNvPr>
+          <p:cNvSpPr txBox="1"/>
+          <p:nvPr/>
+        </p:nvSpPr>
+        <p:spPr>
+          <a:xfrm>
+            <a:off x="16853762" y="24436761"/>
+            <a:ext cx="2804091" cy="215444"/>
+          </a:xfrm>
+          <a:prstGeom prst="rect">
+            <a:avLst/>
+          </a:prstGeom>
+          <a:noFill/>
+        </p:spPr>
+        <p:txBody>
+          <a:bodyPr wrap="square" lIns="0" tIns="0" rIns="0" bIns="0" rtlCol="0">
+            <a:spAutoFit/>
+          </a:bodyPr>
+          <a:lstStyle>
+            <a:defPPr>
+              <a:defRPr lang="en-US"/>
+            </a:defPPr>
+            <a:lvl1pPr algn="r">
+              <a:defRPr sz="1400">
+                <a:solidFill>
+                  <a:srgbClr val="0070C0"/>
+                </a:solidFill>
+              </a:defRPr>
+            </a:lvl1pPr>
+          </a:lstStyle>
+          <a:p>
+            <a:r>
+              <a:rPr lang="en-US" dirty="0">
+                <a:solidFill>
+                  <a:schemeClr val="accent4">
+                    <a:lumMod val="75000"/>
+                  </a:schemeClr>
+                </a:solidFill>
+              </a:rPr>
+              <a:t>commitEquipmentManager()</a:t>
+            </a:r>
+            <a:endParaRPr lang="en-US" dirty="0"/>
+          </a:p>
+        </p:txBody>
+      </p:sp>
+      <p:cxnSp>
+        <p:nvCxnSpPr>
+          <p:cNvPr id="107" name="Straight Arrow Connector 106">
+            <a:extLst>
+              <a:ext uri="{FF2B5EF4-FFF2-40B4-BE49-F238E27FC236}">
+                <a16:creationId xmlns:a16="http://schemas.microsoft.com/office/drawing/2014/main" id="{AD981EFD-4E63-994B-BD9C-7E9702474061}"/>
+              </a:ext>
+            </a:extLst>
+          </p:cNvPr>
+          <p:cNvCxnSpPr/>
+          <p:nvPr/>
+        </p:nvCxnSpPr>
+        <p:spPr>
+          <a:xfrm>
+            <a:off x="4565552" y="25240270"/>
+            <a:ext cx="1196051" cy="0"/>
+          </a:xfrm>
+          <a:prstGeom prst="straightConnector1">
+            <a:avLst/>
+          </a:prstGeom>
+          <a:ln w="19050">
+            <a:solidFill>
+              <a:schemeClr val="accent1"/>
+            </a:solidFill>
+            <a:prstDash val="sysDash"/>
+            <a:headEnd type="arrow" w="med" len="med"/>
+            <a:tailEnd type="none" w="med" len="med"/>
+          </a:ln>
+        </p:spPr>
+        <p:style>
+          <a:lnRef idx="1">
+            <a:schemeClr val="accent1"/>
+          </a:lnRef>
+          <a:fillRef idx="0">
+            <a:schemeClr val="accent1"/>
+          </a:fillRef>
+          <a:effectRef idx="0">
+            <a:schemeClr val="accent1"/>
+          </a:effectRef>
+          <a:fontRef idx="minor">
+            <a:schemeClr val="tx1"/>
+          </a:fontRef>
+        </p:style>
+      </p:cxnSp>
+      <p:sp>
+        <p:nvSpPr>
+          <p:cNvPr id="108" name="TextBox 107">
+            <a:extLst>
+              <a:ext uri="{FF2B5EF4-FFF2-40B4-BE49-F238E27FC236}">
+                <a16:creationId xmlns:a16="http://schemas.microsoft.com/office/drawing/2014/main" id="{BBC7601B-49E1-2547-BE08-5BADB70C59FD}"/>
+              </a:ext>
+            </a:extLst>
+          </p:cNvPr>
+          <p:cNvSpPr txBox="1"/>
+          <p:nvPr/>
+        </p:nvSpPr>
+        <p:spPr>
+          <a:xfrm>
+            <a:off x="4829823" y="24987728"/>
+            <a:ext cx="762000" cy="215444"/>
+          </a:xfrm>
+          <a:prstGeom prst="rect">
+            <a:avLst/>
+          </a:prstGeom>
+          <a:noFill/>
+        </p:spPr>
+        <p:txBody>
+          <a:bodyPr wrap="square" lIns="0" tIns="0" rIns="0" bIns="0" rtlCol="0">
+            <a:spAutoFit/>
+          </a:bodyPr>
+          <a:lstStyle>
+            <a:defPPr>
+              <a:defRPr lang="en-US"/>
+            </a:defPPr>
+            <a:lvl1pPr algn="r">
+              <a:defRPr sz="1400">
+                <a:solidFill>
+                  <a:srgbClr val="0070C0"/>
+                </a:solidFill>
+              </a:defRPr>
+            </a:lvl1pPr>
+          </a:lstStyle>
+          <a:p>
+            <a:r>
+              <a:rPr lang="en-US" dirty="0"/>
+              <a:t>result</a:t>
+            </a:r>
+          </a:p>
+        </p:txBody>
+      </p:sp>
+      <p:sp>
+        <p:nvSpPr>
+          <p:cNvPr id="111" name="TextBox 110">
+            <a:extLst>
+              <a:ext uri="{FF2B5EF4-FFF2-40B4-BE49-F238E27FC236}">
+                <a16:creationId xmlns:a16="http://schemas.microsoft.com/office/drawing/2014/main" id="{AA3CE234-63CC-B34F-9B25-529E9F19DB73}"/>
+              </a:ext>
+            </a:extLst>
+          </p:cNvPr>
+          <p:cNvSpPr txBox="1"/>
+          <p:nvPr/>
+        </p:nvSpPr>
+        <p:spPr>
+          <a:xfrm>
+            <a:off x="2988469" y="14113669"/>
+            <a:ext cx="609462" cy="338554"/>
+          </a:xfrm>
+          <a:prstGeom prst="rect">
+            <a:avLst/>
+          </a:prstGeom>
+          <a:solidFill>
+            <a:schemeClr val="accent1">
+              <a:lumMod val="20000"/>
+              <a:lumOff val="80000"/>
+            </a:schemeClr>
+          </a:solidFill>
+        </p:spPr>
+        <p:txBody>
+          <a:bodyPr wrap="none" rtlCol="0">
+            <a:spAutoFit/>
+          </a:bodyPr>
+          <a:lstStyle/>
+          <a:p>
+            <a:r>
+              <a:rPr lang="en-US" sz="1600" dirty="0">
+                <a:solidFill>
+                  <a:srgbClr val="0070C0"/>
+                </a:solidFill>
+              </a:rPr>
+              <a:t>Logic</a:t>
+            </a:r>
+          </a:p>
+        </p:txBody>
+      </p:sp>
+    </p:spTree>
+    <p:extLst>
+      <p:ext uri="{BB962C8B-B14F-4D97-AF65-F5344CB8AC3E}">
+        <p14:creationId xmlns:p14="http://schemas.microsoft.com/office/powerpoint/2010/main" val="1003474212"/>
       </p:ext>
     </p:extLst>
   </p:cSld>

</xml_diff>